<commit_message>
feat: add 45, 46 add two programs
</commit_message>
<xml_diff>
--- a/Урок 45, 46. Створення та використання модулів користувача. Опрацювання виняткових ситуацій/Створення та використання модулів користувача. Опрацювання виняткових ситуацій.pptx
+++ b/Урок 45, 46. Створення та використання модулів користувача. Опрацювання виняткових ситуацій/Створення та використання модулів користувача. Опрацювання виняткових ситуацій.pptx
@@ -7,9 +7,9 @@
   <p:sldIdLst>
     <p:sldId id="256" r:id="rId2"/>
     <p:sldId id="257" r:id="rId3"/>
-    <p:sldId id="266" r:id="rId4"/>
-    <p:sldId id="271" r:id="rId5"/>
-    <p:sldId id="272" r:id="rId6"/>
+    <p:sldId id="271" r:id="rId4"/>
+    <p:sldId id="272" r:id="rId5"/>
+    <p:sldId id="273" r:id="rId6"/>
     <p:sldId id="265" r:id="rId7"/>
     <p:sldId id="270" r:id="rId8"/>
   </p:sldIdLst>
@@ -20957,7 +20957,7 @@
           <a:p>
             <a:r>
               <a:rPr lang="uk-UA" dirty="0"/>
-              <a:t>Композиційний підхід</a:t>
+              <a:t>Модулі користувача</a:t>
             </a:r>
             <a:endParaRPr lang="x-none" dirty="0"/>
           </a:p>
@@ -20993,15 +20993,19 @@
           <a:p>
             <a:r>
               <a:rPr lang="ru-RU" sz="2800" dirty="0" err="1"/>
-              <a:t>Сутність</a:t>
+              <a:t>Мова</a:t>
             </a:r>
             <a:r>
               <a:rPr lang="ru-RU" sz="2800" dirty="0"/>
               <a:t> </a:t>
             </a:r>
             <a:r>
+              <a:rPr lang="en-US" sz="2800" dirty="0"/>
+              <a:t>Python </a:t>
+            </a:r>
+            <a:r>
               <a:rPr lang="ru-RU" sz="2800" dirty="0" err="1"/>
-              <a:t>композиційного</a:t>
+              <a:t>реалізує</a:t>
             </a:r>
             <a:r>
               <a:rPr lang="ru-RU" sz="2800" dirty="0"/>
@@ -21009,7 +21013,47 @@
             </a:r>
             <a:r>
               <a:rPr lang="ru-RU" sz="2800" dirty="0" err="1"/>
-              <a:t>підходу</a:t>
+              <a:t>модульний</a:t>
+            </a:r>
+            <a:r>
+              <a:rPr lang="ru-RU" sz="2800" dirty="0"/>
+              <a:t> принцип </a:t>
+            </a:r>
+            <a:r>
+              <a:rPr lang="ru-RU" sz="2800" dirty="0" err="1"/>
+              <a:t>організації</a:t>
+            </a:r>
+            <a:r>
+              <a:rPr lang="ru-RU" sz="2800" dirty="0"/>
+              <a:t> </a:t>
+            </a:r>
+            <a:r>
+              <a:rPr lang="ru-RU" sz="2800" dirty="0" err="1"/>
+              <a:t>програм</a:t>
+            </a:r>
+            <a:r>
+              <a:rPr lang="ru-RU" sz="2800" dirty="0"/>
+              <a:t>, </a:t>
+            </a:r>
+            <a:r>
+              <a:rPr lang="ru-RU" sz="2800" dirty="0" err="1"/>
+              <a:t>який</a:t>
+            </a:r>
+            <a:r>
+              <a:rPr lang="ru-RU" sz="2800" dirty="0"/>
+              <a:t> </a:t>
+            </a:r>
+            <a:r>
+              <a:rPr lang="ru-RU" sz="2800" dirty="0" err="1"/>
+              <a:t>передбачає</a:t>
+            </a:r>
+            <a:r>
+              <a:rPr lang="ru-RU" sz="2800" dirty="0"/>
+              <a:t> </a:t>
+            </a:r>
+            <a:r>
+              <a:rPr lang="ru-RU" sz="2800" dirty="0" err="1"/>
+              <a:t>імпортування</a:t>
             </a:r>
             <a:r>
               <a:rPr lang="ru-RU" sz="2800" dirty="0"/>
@@ -21017,7 +21061,15 @@
             </a:r>
             <a:r>
               <a:rPr lang="ru-RU" sz="2800" dirty="0" err="1"/>
-              <a:t>програмуванні</a:t>
+              <a:t>основний</a:t>
+            </a:r>
+            <a:r>
+              <a:rPr lang="ru-RU" sz="2800" dirty="0"/>
+              <a:t> файл коду </a:t>
+            </a:r>
+            <a:r>
+              <a:rPr lang="ru-RU" sz="2800" dirty="0" err="1"/>
+              <a:t>вмісту</a:t>
             </a:r>
             <a:r>
               <a:rPr lang="ru-RU" sz="2800" dirty="0"/>
@@ -21025,230 +21077,44 @@
             </a:r>
             <a:r>
               <a:rPr lang="ru-RU" sz="2800" dirty="0" err="1"/>
-              <a:t>мовою</a:t>
-            </a:r>
-            <a:endParaRPr lang="ru-RU" sz="2800" dirty="0"/>
+              <a:t>інших</a:t>
+            </a:r>
+            <a:r>
+              <a:rPr lang="ru-RU" sz="2800" dirty="0"/>
+              <a:t> </a:t>
+            </a:r>
+            <a:r>
+              <a:rPr lang="ru-RU" sz="2800" dirty="0" err="1"/>
+              <a:t>файлів</a:t>
+            </a:r>
+            <a:r>
+              <a:rPr lang="ru-RU" sz="2800" dirty="0"/>
+              <a:t>.</a:t>
+            </a:r>
+            <a:endParaRPr lang="en-US" sz="2800" dirty="0"/>
           </a:p>
           <a:p>
             <a:r>
+              <a:rPr lang="uk-UA" sz="2800" dirty="0"/>
+              <a:t>При написанні програми, з її коду можна перенести описи класів та функцій до окремого класу, доступ до якого можна відкрити інструкціями </a:t>
+            </a:r>
+            <a:r>
+              <a:rPr lang="en-US" sz="2800" b="1" dirty="0"/>
+              <a:t>import</a:t>
+            </a:r>
+            <a:r>
               <a:rPr lang="en-US" sz="2800" dirty="0"/>
-              <a:t>Python </a:t>
-            </a:r>
-            <a:r>
-              <a:rPr lang="ru-RU" sz="2800" dirty="0" err="1"/>
-              <a:t>полягає</a:t>
-            </a:r>
-            <a:r>
-              <a:rPr lang="ru-RU" sz="2800" dirty="0"/>
-              <a:t> в тому, </a:t>
-            </a:r>
-            <a:r>
-              <a:rPr lang="ru-RU" sz="2800" dirty="0" err="1"/>
-              <a:t>що</a:t>
-            </a:r>
-            <a:r>
-              <a:rPr lang="ru-RU" sz="2800" dirty="0"/>
-              <a:t> в </a:t>
-            </a:r>
-            <a:r>
-              <a:rPr lang="ru-RU" sz="2800" dirty="0" err="1"/>
-              <a:t>класі</a:t>
-            </a:r>
-            <a:r>
-              <a:rPr lang="ru-RU" sz="2800" dirty="0"/>
-              <a:t>, </a:t>
-            </a:r>
-            <a:r>
-              <a:rPr lang="ru-RU" sz="2800" dirty="0" err="1"/>
-              <a:t>який</a:t>
-            </a:r>
-            <a:r>
-              <a:rPr lang="ru-RU" sz="2800" dirty="0"/>
               <a:t> </a:t>
             </a:r>
             <a:r>
-              <a:rPr lang="ru-RU" sz="2800" dirty="0" err="1"/>
-              <a:t>називається</a:t>
-            </a:r>
-            <a:r>
-              <a:rPr lang="ru-RU" sz="2800" dirty="0"/>
-              <a:t> </a:t>
-            </a:r>
-            <a:r>
-              <a:rPr lang="ru-RU" sz="2800" dirty="0" err="1"/>
-              <a:t>класом</a:t>
-            </a:r>
-            <a:r>
-              <a:rPr lang="ru-RU" sz="2800" dirty="0"/>
-              <a:t>-</a:t>
-            </a:r>
-          </a:p>
-          <a:p>
-            <a:r>
-              <a:rPr lang="ru-RU" sz="2800" dirty="0"/>
-              <a:t>контейнером, </a:t>
-            </a:r>
-            <a:r>
-              <a:rPr lang="ru-RU" sz="2800" dirty="0" err="1"/>
-              <a:t>створюються</a:t>
-            </a:r>
-            <a:r>
-              <a:rPr lang="ru-RU" sz="2800" dirty="0"/>
-              <a:t> </a:t>
-            </a:r>
-            <a:r>
-              <a:rPr lang="ru-RU" sz="2800" dirty="0" err="1"/>
-              <a:t>інструкції</a:t>
-            </a:r>
-            <a:r>
-              <a:rPr lang="ru-RU" sz="2800" dirty="0"/>
-              <a:t> </a:t>
-            </a:r>
-            <a:r>
-              <a:rPr lang="ru-RU" sz="2800" dirty="0" err="1"/>
-              <a:t>виклику</a:t>
-            </a:r>
-            <a:r>
-              <a:rPr lang="ru-RU" sz="2800" dirty="0"/>
-              <a:t> </a:t>
-            </a:r>
-            <a:r>
-              <a:rPr lang="ru-RU" sz="2800" dirty="0" err="1"/>
-              <a:t>інших</a:t>
-            </a:r>
-            <a:r>
-              <a:rPr lang="ru-RU" sz="2800" dirty="0"/>
-              <a:t> </a:t>
-            </a:r>
-            <a:r>
-              <a:rPr lang="ru-RU" sz="2800" dirty="0" err="1"/>
-              <a:t>класів</a:t>
-            </a:r>
-            <a:r>
-              <a:rPr lang="ru-RU" sz="2800" dirty="0"/>
-              <a:t>.</a:t>
-            </a:r>
-          </a:p>
-          <a:p>
-            <a:r>
-              <a:rPr lang="ru-RU" sz="2800" dirty="0" err="1"/>
-              <a:t>Такий</a:t>
-            </a:r>
-            <a:r>
-              <a:rPr lang="ru-RU" sz="2800" dirty="0"/>
-              <a:t> </a:t>
-            </a:r>
-            <a:r>
-              <a:rPr lang="ru-RU" sz="2800" dirty="0" err="1"/>
-              <a:t>підхід</a:t>
-            </a:r>
-            <a:r>
-              <a:rPr lang="ru-RU" sz="2800" dirty="0"/>
-              <a:t> </a:t>
-            </a:r>
-            <a:r>
-              <a:rPr lang="ru-RU" sz="2800" dirty="0" err="1"/>
-              <a:t>дає</a:t>
-            </a:r>
-            <a:r>
-              <a:rPr lang="ru-RU" sz="2800" dirty="0"/>
-              <a:t> </a:t>
-            </a:r>
-            <a:r>
-              <a:rPr lang="ru-RU" sz="2800" dirty="0" err="1"/>
-              <a:t>змогу</a:t>
-            </a:r>
-            <a:r>
-              <a:rPr lang="ru-RU" sz="2800" dirty="0"/>
-              <a:t> на </a:t>
-            </a:r>
-            <a:r>
-              <a:rPr lang="ru-RU" sz="2800" dirty="0" err="1"/>
-              <a:t>основі</a:t>
-            </a:r>
-            <a:r>
-              <a:rPr lang="ru-RU" sz="2800" dirty="0"/>
-              <a:t> </a:t>
-            </a:r>
-            <a:r>
-              <a:rPr lang="ru-RU" sz="2800" dirty="0" err="1"/>
-              <a:t>створених</a:t>
-            </a:r>
-            <a:r>
-              <a:rPr lang="ru-RU" sz="2800" dirty="0"/>
-              <a:t> </a:t>
-            </a:r>
-            <a:r>
-              <a:rPr lang="ru-RU" sz="2800" dirty="0" err="1"/>
-              <a:t>об’єктів</a:t>
-            </a:r>
-            <a:r>
-              <a:rPr lang="ru-RU" sz="2800" dirty="0"/>
-              <a:t> </a:t>
-            </a:r>
-            <a:r>
-              <a:rPr lang="ru-RU" sz="2800" dirty="0" err="1"/>
-              <a:t>класу</a:t>
-            </a:r>
-            <a:r>
-              <a:rPr lang="ru-RU" sz="2800" dirty="0"/>
-              <a:t>-кон-</a:t>
-            </a:r>
-          </a:p>
-          <a:p>
-            <a:r>
-              <a:rPr lang="ru-RU" sz="2800" dirty="0" err="1"/>
-              <a:t>тейнера</a:t>
-            </a:r>
-            <a:r>
-              <a:rPr lang="ru-RU" sz="2800" dirty="0"/>
-              <a:t> </a:t>
-            </a:r>
-            <a:r>
-              <a:rPr lang="ru-RU" sz="2800" dirty="0" err="1"/>
-              <a:t>отримати</a:t>
-            </a:r>
-            <a:r>
-              <a:rPr lang="ru-RU" sz="2800" dirty="0"/>
-              <a:t> і </a:t>
-            </a:r>
-            <a:r>
-              <a:rPr lang="ru-RU" sz="2800" dirty="0" err="1"/>
-              <a:t>об’єкти</a:t>
-            </a:r>
-            <a:r>
-              <a:rPr lang="ru-RU" sz="2800" dirty="0"/>
-              <a:t> </a:t>
-            </a:r>
-            <a:r>
-              <a:rPr lang="ru-RU" sz="2800" dirty="0" err="1"/>
-              <a:t>класів</a:t>
-            </a:r>
-            <a:r>
-              <a:rPr lang="ru-RU" sz="2800" dirty="0"/>
-              <a:t>, </a:t>
-            </a:r>
-            <a:r>
-              <a:rPr lang="ru-RU" sz="2800" dirty="0" err="1"/>
-              <a:t>що</a:t>
-            </a:r>
-            <a:r>
-              <a:rPr lang="ru-RU" sz="2800" dirty="0"/>
-              <a:t> з </a:t>
-            </a:r>
-            <a:r>
-              <a:rPr lang="ru-RU" sz="2800" dirty="0" err="1"/>
-              <a:t>нього</a:t>
-            </a:r>
-            <a:r>
-              <a:rPr lang="ru-RU" sz="2800" dirty="0"/>
-              <a:t> </a:t>
-            </a:r>
-            <a:r>
-              <a:rPr lang="ru-RU" sz="2800" dirty="0" err="1"/>
-              <a:t>викликаються</a:t>
-            </a:r>
-            <a:endParaRPr lang="LID4096" sz="2800" dirty="0"/>
+              <a:rPr lang="uk-UA" sz="2800" dirty="0"/>
+              <a:t>або </a:t>
+            </a:r>
+            <a:r>
+              <a:rPr lang="en-US" sz="2800" b="1" dirty="0"/>
+              <a:t>from … import …</a:t>
+            </a:r>
+            <a:endParaRPr lang="ru-RU" sz="2800" b="1" dirty="0"/>
           </a:p>
         </p:txBody>
       </p:sp>
@@ -21311,22 +21177,10 @@
           <a:lstStyle/>
           <a:p>
             <a:r>
-              <a:rPr lang="ru-RU" sz="4800" dirty="0" err="1"/>
-              <a:t>Композиція</a:t>
-            </a:r>
-            <a:r>
-              <a:rPr lang="ru-RU" sz="4800" dirty="0"/>
-              <a:t> (</a:t>
-            </a:r>
-            <a:r>
-              <a:rPr lang="ru-RU" sz="4800" dirty="0" err="1"/>
-              <a:t>агрегатування</a:t>
-            </a:r>
-            <a:r>
-              <a:rPr lang="ru-RU" sz="4800" dirty="0"/>
-              <a:t>)</a:t>
-            </a:r>
-            <a:endParaRPr lang="x-none" sz="4800" dirty="0"/>
+              <a:rPr lang="uk-UA" dirty="0"/>
+              <a:t>Модулі</a:t>
+            </a:r>
+            <a:endParaRPr lang="x-none" dirty="0"/>
           </a:p>
         </p:txBody>
       </p:sp>
@@ -21348,214 +21202,63 @@
         </p:nvSpPr>
         <p:spPr>
           <a:xfrm>
-            <a:off x="705471" y="1937960"/>
-            <a:ext cx="6761571" cy="2307060"/>
+            <a:off x="1024126" y="2196223"/>
+            <a:ext cx="9720073" cy="948760"/>
           </a:xfrm>
         </p:spPr>
         <p:txBody>
           <a:bodyPr>
-            <a:normAutofit fontScale="92500" lnSpcReduction="10000"/>
+            <a:noAutofit/>
           </a:bodyPr>
           <a:lstStyle/>
           <a:p>
             <a:r>
-              <a:rPr lang="ru-RU" sz="2400" b="1" dirty="0" err="1"/>
-              <a:t>Композиція</a:t>
-            </a:r>
-            <a:r>
-              <a:rPr lang="ru-RU" sz="2400" dirty="0"/>
+              <a:rPr lang="ru-RU" sz="3600" dirty="0"/>
+              <a:t>2 </a:t>
+            </a:r>
+            <a:r>
+              <a:rPr lang="ru-RU" sz="3600" dirty="0" err="1"/>
+              <a:t>способи</a:t>
+            </a:r>
+            <a:r>
+              <a:rPr lang="ru-RU" sz="3600" dirty="0"/>
               <a:t> </a:t>
             </a:r>
             <a:r>
-              <a:rPr lang="ru-RU" sz="2400" b="0" i="0" dirty="0">
-                <a:solidFill>
-                  <a:srgbClr val="000000"/>
-                </a:solidFill>
-                <a:effectLst/>
-                <a:latin typeface="arial" panose="020B0604020202020204" pitchFamily="34" charset="0"/>
-              </a:rPr>
-              <a:t>(</a:t>
-            </a:r>
-            <a:r>
-              <a:rPr lang="ru-RU" sz="2400" b="0" i="0" dirty="0" err="1">
-                <a:solidFill>
-                  <a:srgbClr val="000000"/>
-                </a:solidFill>
-                <a:effectLst/>
-                <a:latin typeface="arial" panose="020B0604020202020204" pitchFamily="34" charset="0"/>
-              </a:rPr>
-              <a:t>від</a:t>
-            </a:r>
-            <a:r>
-              <a:rPr lang="ru-RU" sz="2400" b="0" i="0" dirty="0">
-                <a:solidFill>
-                  <a:srgbClr val="000000"/>
-                </a:solidFill>
-                <a:effectLst/>
-                <a:latin typeface="arial" panose="020B0604020202020204" pitchFamily="34" charset="0"/>
-              </a:rPr>
-              <a:t> лат. </a:t>
-            </a:r>
-            <a:r>
-              <a:rPr lang="ru-RU" sz="2400" b="0" i="0" dirty="0" err="1">
-                <a:solidFill>
-                  <a:srgbClr val="000000"/>
-                </a:solidFill>
-                <a:effectLst/>
-                <a:latin typeface="arial" panose="020B0604020202020204" pitchFamily="34" charset="0"/>
-              </a:rPr>
-              <a:t>compositio</a:t>
-            </a:r>
-            <a:r>
-              <a:rPr lang="ru-RU" sz="2400" b="0" i="0" dirty="0">
-                <a:solidFill>
-                  <a:srgbClr val="000000"/>
-                </a:solidFill>
-                <a:effectLst/>
-                <a:latin typeface="arial" panose="020B0604020202020204" pitchFamily="34" charset="0"/>
-              </a:rPr>
-              <a:t> - </a:t>
-            </a:r>
-            <a:r>
-              <a:rPr lang="ru-RU" sz="2400" b="0" i="0" dirty="0" err="1">
-                <a:solidFill>
-                  <a:srgbClr val="000000"/>
-                </a:solidFill>
-                <a:effectLst/>
-                <a:latin typeface="arial" panose="020B0604020202020204" pitchFamily="34" charset="0"/>
-              </a:rPr>
-              <a:t>складання</a:t>
-            </a:r>
-            <a:r>
-              <a:rPr lang="ru-RU" sz="2400" b="0" i="0" dirty="0">
-                <a:solidFill>
-                  <a:srgbClr val="000000"/>
-                </a:solidFill>
-                <a:effectLst/>
-                <a:latin typeface="arial" panose="020B0604020202020204" pitchFamily="34" charset="0"/>
-              </a:rPr>
-              <a:t>, </a:t>
-            </a:r>
-            <a:r>
-              <a:rPr lang="ru-RU" sz="2400" b="0" i="0" dirty="0" err="1">
-                <a:solidFill>
-                  <a:srgbClr val="000000"/>
-                </a:solidFill>
-                <a:effectLst/>
-                <a:latin typeface="arial" panose="020B0604020202020204" pitchFamily="34" charset="0"/>
-              </a:rPr>
-              <a:t>зв’язування</a:t>
-            </a:r>
-            <a:r>
-              <a:rPr lang="ru-RU" sz="2400" b="0" i="0" dirty="0">
-                <a:solidFill>
-                  <a:srgbClr val="000000"/>
-                </a:solidFill>
-                <a:effectLst/>
-                <a:latin typeface="arial" panose="020B0604020202020204" pitchFamily="34" charset="0"/>
-              </a:rPr>
-              <a:t>)</a:t>
-            </a:r>
-            <a:endParaRPr lang="ru-RU" sz="3200" dirty="0"/>
+              <a:rPr lang="ru-RU" sz="3600" dirty="0" err="1"/>
+              <a:t>підключення</a:t>
+            </a:r>
+            <a:r>
+              <a:rPr lang="ru-RU" sz="3600" dirty="0"/>
+              <a:t> </a:t>
+            </a:r>
+            <a:r>
+              <a:rPr lang="ru-RU" sz="3600" dirty="0" err="1"/>
+              <a:t>модулів</a:t>
+            </a:r>
+            <a:r>
+              <a:rPr lang="ru-RU" sz="3600" dirty="0"/>
+              <a:t> до </a:t>
+            </a:r>
+            <a:r>
+              <a:rPr lang="ru-RU" sz="3600" dirty="0" err="1"/>
+              <a:t>програми</a:t>
+            </a:r>
+            <a:r>
+              <a:rPr lang="ru-RU" sz="3600" dirty="0"/>
+              <a:t> </a:t>
+            </a:r>
+            <a:r>
+              <a:rPr lang="ru-RU" sz="3600" dirty="0" err="1"/>
+              <a:t>користувача</a:t>
+            </a:r>
+            <a:r>
+              <a:rPr lang="ru-RU" sz="3600" dirty="0"/>
+              <a:t>:</a:t>
+            </a:r>
           </a:p>
           <a:p>
-            <a:r>
-              <a:rPr lang="ru-RU" sz="3200" b="1" dirty="0" err="1"/>
-              <a:t>Композиція</a:t>
-            </a:r>
-            <a:r>
-              <a:rPr lang="ru-RU" sz="3200" dirty="0"/>
-              <a:t> в </a:t>
-            </a:r>
-            <a:r>
-              <a:rPr lang="ru-RU" sz="3200" dirty="0" err="1"/>
-              <a:t>програмуванні</a:t>
-            </a:r>
-            <a:r>
-              <a:rPr lang="ru-RU" sz="3200" dirty="0"/>
-              <a:t> — </a:t>
-            </a:r>
-            <a:r>
-              <a:rPr lang="ru-RU" sz="3200" dirty="0" err="1"/>
-              <a:t>це</a:t>
-            </a:r>
-            <a:r>
-              <a:rPr lang="ru-RU" sz="3200" dirty="0"/>
-              <a:t> </a:t>
-            </a:r>
-            <a:r>
-              <a:rPr lang="ru-RU" sz="3200" dirty="0" err="1"/>
-              <a:t>вбудовування</a:t>
-            </a:r>
-            <a:r>
-              <a:rPr lang="ru-RU" sz="3200" dirty="0"/>
-              <a:t> </a:t>
-            </a:r>
-            <a:r>
-              <a:rPr lang="ru-RU" sz="3200" dirty="0" err="1"/>
-              <a:t>інших</a:t>
-            </a:r>
-            <a:r>
-              <a:rPr lang="ru-RU" sz="3200" dirty="0"/>
-              <a:t> </a:t>
-            </a:r>
-            <a:r>
-              <a:rPr lang="ru-RU" sz="3200" dirty="0" err="1"/>
-              <a:t>об’єктів</a:t>
-            </a:r>
-            <a:r>
-              <a:rPr lang="ru-RU" sz="3200" dirty="0"/>
-              <a:t> у </a:t>
-            </a:r>
-            <a:r>
-              <a:rPr lang="ru-RU" sz="3200" dirty="0" err="1"/>
-              <a:t>об’єк</a:t>
-            </a:r>
-            <a:r>
-              <a:rPr lang="ru-RU" sz="3200" dirty="0"/>
-              <a:t>-контейнер і </a:t>
-            </a:r>
-            <a:r>
-              <a:rPr lang="ru-RU" sz="3200" dirty="0" err="1"/>
-              <a:t>використання</a:t>
-            </a:r>
-            <a:r>
-              <a:rPr lang="ru-RU" sz="3200" dirty="0"/>
-              <a:t> </a:t>
-            </a:r>
-            <a:r>
-              <a:rPr lang="ru-RU" sz="3200" dirty="0" err="1"/>
-              <a:t>їх</a:t>
-            </a:r>
-            <a:r>
-              <a:rPr lang="ru-RU" sz="3200" dirty="0"/>
-              <a:t> для </a:t>
-            </a:r>
-            <a:r>
-              <a:rPr lang="ru-RU" sz="3200" dirty="0" err="1"/>
-              <a:t>реалізації</a:t>
-            </a:r>
-            <a:r>
-              <a:rPr lang="ru-RU" sz="3200" dirty="0"/>
-              <a:t> </a:t>
-            </a:r>
-            <a:r>
-              <a:rPr lang="ru-RU" sz="3200" dirty="0" err="1"/>
-              <a:t>методів</a:t>
-            </a:r>
-            <a:r>
-              <a:rPr lang="ru-RU" sz="3200" dirty="0"/>
-              <a:t> </a:t>
-            </a:r>
-            <a:r>
-              <a:rPr lang="ru-RU" sz="3200" dirty="0" err="1"/>
-              <a:t>класу</a:t>
-            </a:r>
-            <a:r>
-              <a:rPr lang="ru-RU" sz="3200" dirty="0"/>
-              <a:t>-контейнера.</a:t>
-            </a:r>
-            <a:endParaRPr lang="LID4096" sz="3200" dirty="0"/>
+            <a:endParaRPr lang="LID4096" sz="3600" dirty="0"/>
           </a:p>
         </p:txBody>
       </p:sp>
@@ -21564,7 +21267,7 @@
           <p:cNvPr id="5" name="TextBox 4">
             <a:extLst>
               <a:ext uri="{FF2B5EF4-FFF2-40B4-BE49-F238E27FC236}">
-                <a16:creationId xmlns:a16="http://schemas.microsoft.com/office/drawing/2014/main" id="{71257E04-5490-44E7-B4C7-762583CAA4CD}"/>
+                <a16:creationId xmlns:a16="http://schemas.microsoft.com/office/drawing/2014/main" id="{A25A21F3-3A90-426C-9625-F0835E55D43F}"/>
               </a:ext>
             </a:extLst>
           </p:cNvPr>
@@ -21573,13 +21276,15 @@
         </p:nvSpPr>
         <p:spPr>
           <a:xfrm>
-            <a:off x="429490" y="4391892"/>
-            <a:ext cx="6871297" cy="2031325"/>
+            <a:off x="827254" y="4703124"/>
+            <a:ext cx="4285074" cy="1384995"/>
           </a:xfrm>
           <a:prstGeom prst="rect">
             <a:avLst/>
           </a:prstGeom>
-          <a:noFill/>
+          <a:solidFill>
+            <a:schemeClr val="tx1"/>
+          </a:solidFill>
         </p:spPr>
         <p:txBody>
           <a:bodyPr wrap="square">
@@ -21588,55 +21293,105 @@
           <a:lstStyle/>
           <a:p>
             <a:r>
-              <a:rPr lang="uk-UA" b="0" i="0" dirty="0">
+              <a:rPr lang="en-US" sz="2800" b="0" dirty="0">
                 <a:solidFill>
-                  <a:srgbClr val="222222"/>
+                  <a:srgbClr val="C586C0"/>
                 </a:solidFill>
                 <a:effectLst/>
-                <a:latin typeface="Roboto" pitchFamily="2" charset="0"/>
+                <a:latin typeface="Consolas" panose="020B0609020204030204" pitchFamily="49" charset="0"/>
               </a:rPr>
-              <a:t>Щоб зрозуміти, навіщо потрібна композиція в програмуванні, проведемо аналогію з реальним світом. Більшість біологічних і технічних об'єктів складаються з більш простих частин, також є об'єктами. Наприклад, тварина складається з різний органів (серце, шлунок), комп'ютер - з різного "заліза" (процесор, пам'ять).</a:t>
-            </a:r>
-            <a:endParaRPr lang="LID4096" dirty="0"/>
+              <a:t>import</a:t>
+            </a:r>
+            <a:r>
+              <a:rPr lang="en-US" sz="2800" b="0" dirty="0">
+                <a:solidFill>
+                  <a:srgbClr val="D4D4D4"/>
+                </a:solidFill>
+                <a:effectLst/>
+                <a:latin typeface="Consolas" panose="020B0609020204030204" pitchFamily="49" charset="0"/>
+              </a:rPr>
+              <a:t> math</a:t>
+            </a:r>
+          </a:p>
+          <a:p>
+            <a:br>
+              <a:rPr lang="en-US" sz="2800" b="0" dirty="0">
+                <a:solidFill>
+                  <a:srgbClr val="D4D4D4"/>
+                </a:solidFill>
+                <a:effectLst/>
+                <a:latin typeface="Consolas" panose="020B0609020204030204" pitchFamily="49" charset="0"/>
+              </a:rPr>
+            </a:br>
+            <a:r>
+              <a:rPr lang="en-US" sz="2800" b="0" dirty="0">
+                <a:solidFill>
+                  <a:srgbClr val="DCDCAA"/>
+                </a:solidFill>
+                <a:effectLst/>
+                <a:latin typeface="Consolas" panose="020B0609020204030204" pitchFamily="49" charset="0"/>
+              </a:rPr>
+              <a:t>print</a:t>
+            </a:r>
+            <a:r>
+              <a:rPr lang="en-US" sz="2800" b="0" dirty="0">
+                <a:solidFill>
+                  <a:srgbClr val="D4D4D4"/>
+                </a:solidFill>
+                <a:effectLst/>
+                <a:latin typeface="Consolas" panose="020B0609020204030204" pitchFamily="49" charset="0"/>
+              </a:rPr>
+              <a:t>(</a:t>
+            </a:r>
+            <a:r>
+              <a:rPr lang="en-US" sz="2800" b="0" dirty="0">
+                <a:solidFill>
+                  <a:srgbClr val="CE9178"/>
+                </a:solidFill>
+                <a:effectLst/>
+                <a:latin typeface="Consolas" panose="020B0609020204030204" pitchFamily="49" charset="0"/>
+              </a:rPr>
+              <a:t>"π ="</a:t>
+            </a:r>
+            <a:r>
+              <a:rPr lang="en-US" sz="2800" b="0" dirty="0">
+                <a:solidFill>
+                  <a:srgbClr val="D4D4D4"/>
+                </a:solidFill>
+                <a:effectLst/>
+                <a:latin typeface="Consolas" panose="020B0609020204030204" pitchFamily="49" charset="0"/>
+              </a:rPr>
+              <a:t>, </a:t>
+            </a:r>
+            <a:r>
+              <a:rPr lang="en-US" sz="2800" b="0" dirty="0" err="1">
+                <a:solidFill>
+                  <a:srgbClr val="D4D4D4"/>
+                </a:solidFill>
+                <a:effectLst/>
+                <a:latin typeface="Consolas" panose="020B0609020204030204" pitchFamily="49" charset="0"/>
+              </a:rPr>
+              <a:t>math.pi</a:t>
+            </a:r>
+            <a:r>
+              <a:rPr lang="en-US" sz="2800" b="0" dirty="0">
+                <a:solidFill>
+                  <a:srgbClr val="D4D4D4"/>
+                </a:solidFill>
+                <a:effectLst/>
+                <a:latin typeface="Consolas" panose="020B0609020204030204" pitchFamily="49" charset="0"/>
+              </a:rPr>
+              <a:t>)</a:t>
+            </a:r>
           </a:p>
         </p:txBody>
       </p:sp>
-      <p:pic>
-        <p:nvPicPr>
-          <p:cNvPr id="6" name="Рисунок 5">
+      <p:sp>
+        <p:nvSpPr>
+          <p:cNvPr id="8" name="TextBox 7">
             <a:extLst>
               <a:ext uri="{FF2B5EF4-FFF2-40B4-BE49-F238E27FC236}">
-                <a16:creationId xmlns:a16="http://schemas.microsoft.com/office/drawing/2014/main" id="{F8C40B56-539A-47DB-A71B-446143CAE9C8}"/>
-              </a:ext>
-            </a:extLst>
-          </p:cNvPr>
-          <p:cNvPicPr>
-            <a:picLocks noChangeAspect="1"/>
-          </p:cNvPicPr>
-          <p:nvPr/>
-        </p:nvPicPr>
-        <p:blipFill>
-          <a:blip r:embed="rId2"/>
-          <a:stretch>
-            <a:fillRect/>
-          </a:stretch>
-        </p:blipFill>
-        <p:spPr>
-          <a:xfrm>
-            <a:off x="7467042" y="2765395"/>
-            <a:ext cx="4482620" cy="3773016"/>
-          </a:xfrm>
-          <a:prstGeom prst="rect">
-            <a:avLst/>
-          </a:prstGeom>
-        </p:spPr>
-      </p:pic>
-      <p:sp>
-        <p:nvSpPr>
-          <p:cNvPr id="9" name="TextBox 8">
-            <a:extLst>
-              <a:ext uri="{FF2B5EF4-FFF2-40B4-BE49-F238E27FC236}">
-                <a16:creationId xmlns:a16="http://schemas.microsoft.com/office/drawing/2014/main" id="{CF88660B-37FE-4453-813E-F20326D3CF43}"/>
+                <a16:creationId xmlns:a16="http://schemas.microsoft.com/office/drawing/2014/main" id="{08F55879-A361-4F5A-A785-19F1B011E7E6}"/>
               </a:ext>
             </a:extLst>
           </p:cNvPr>
@@ -21645,7 +21400,7 @@
         </p:nvSpPr>
         <p:spPr>
           <a:xfrm>
-            <a:off x="1038257" y="6419615"/>
+            <a:off x="3934691" y="6440360"/>
             <a:ext cx="6096000" cy="369332"/>
           </a:xfrm>
           <a:prstGeom prst="rect">
@@ -21660,107 +21415,358 @@
           <a:lstStyle/>
           <a:p>
             <a:r>
-              <a:rPr lang="ru-RU" b="0" i="0" dirty="0" err="1">
+              <a:rPr lang="LID4096" dirty="0"/>
+              <a:t>π = 3.141592653589793</a:t>
+            </a:r>
+          </a:p>
+        </p:txBody>
+      </p:sp>
+      <p:sp>
+        <p:nvSpPr>
+          <p:cNvPr id="9" name="TextBox 8">
+            <a:extLst>
+              <a:ext uri="{FF2B5EF4-FFF2-40B4-BE49-F238E27FC236}">
+                <a16:creationId xmlns:a16="http://schemas.microsoft.com/office/drawing/2014/main" id="{B75D3CB7-4ECF-49DF-BB28-533AF03237EE}"/>
+              </a:ext>
+            </a:extLst>
+          </p:cNvPr>
+          <p:cNvSpPr txBox="1"/>
+          <p:nvPr/>
+        </p:nvSpPr>
+        <p:spPr>
+          <a:xfrm>
+            <a:off x="5801035" y="4703124"/>
+            <a:ext cx="4073236" cy="1384995"/>
+          </a:xfrm>
+          <a:prstGeom prst="rect">
+            <a:avLst/>
+          </a:prstGeom>
+          <a:solidFill>
+            <a:schemeClr val="tx1"/>
+          </a:solidFill>
+        </p:spPr>
+        <p:txBody>
+          <a:bodyPr wrap="square">
+            <a:spAutoFit/>
+          </a:bodyPr>
+          <a:lstStyle/>
+          <a:p>
+            <a:r>
+              <a:rPr lang="en-US" sz="2800" b="0" dirty="0">
                 <a:solidFill>
-                  <a:srgbClr val="FF0000"/>
+                  <a:srgbClr val="C586C0"/>
                 </a:solidFill>
                 <a:effectLst/>
-                <a:latin typeface="Roboto" pitchFamily="2" charset="0"/>
+                <a:latin typeface="Consolas" panose="020B0609020204030204" pitchFamily="49" charset="0"/>
               </a:rPr>
-              <a:t>Композиція</a:t>
-            </a:r>
-            <a:r>
-              <a:rPr lang="ru-RU" b="0" i="0" dirty="0">
+              <a:t>from</a:t>
+            </a:r>
+            <a:r>
+              <a:rPr lang="en-US" sz="2800" b="0" dirty="0">
                 <a:solidFill>
-                  <a:srgbClr val="FF0000"/>
+                  <a:srgbClr val="D4D4D4"/>
                 </a:solidFill>
                 <a:effectLst/>
-                <a:latin typeface="Roboto" pitchFamily="2" charset="0"/>
+                <a:latin typeface="Consolas" panose="020B0609020204030204" pitchFamily="49" charset="0"/>
               </a:rPr>
-              <a:t> </a:t>
-            </a:r>
-            <a:r>
-              <a:rPr lang="ru-RU" b="0" i="0" dirty="0" err="1">
+              <a:t> math </a:t>
+            </a:r>
+            <a:r>
+              <a:rPr lang="en-US" sz="2800" b="0" dirty="0">
                 <a:solidFill>
-                  <a:srgbClr val="FF0000"/>
+                  <a:srgbClr val="C586C0"/>
                 </a:solidFill>
                 <a:effectLst/>
-                <a:latin typeface="Roboto" pitchFamily="2" charset="0"/>
+                <a:latin typeface="Consolas" panose="020B0609020204030204" pitchFamily="49" charset="0"/>
               </a:rPr>
-              <a:t>передбачає</a:t>
-            </a:r>
-            <a:r>
-              <a:rPr lang="ru-RU" b="0" i="0" dirty="0">
+              <a:t>import</a:t>
+            </a:r>
+            <a:r>
+              <a:rPr lang="en-US" sz="2800" b="0" dirty="0">
                 <a:solidFill>
-                  <a:srgbClr val="FF0000"/>
+                  <a:srgbClr val="D4D4D4"/>
                 </a:solidFill>
                 <a:effectLst/>
-                <a:latin typeface="Roboto" pitchFamily="2" charset="0"/>
+                <a:latin typeface="Consolas" panose="020B0609020204030204" pitchFamily="49" charset="0"/>
               </a:rPr>
-              <a:t> </a:t>
-            </a:r>
-            <a:r>
-              <a:rPr lang="ru-RU" b="0" i="0" dirty="0" err="1">
+              <a:t> pi</a:t>
+            </a:r>
+          </a:p>
+          <a:p>
+            <a:br>
+              <a:rPr lang="en-US" sz="2800" b="0" dirty="0">
                 <a:solidFill>
-                  <a:srgbClr val="FF0000"/>
+                  <a:srgbClr val="D4D4D4"/>
                 </a:solidFill>
                 <a:effectLst/>
-                <a:latin typeface="Roboto" pitchFamily="2" charset="0"/>
+                <a:latin typeface="Consolas" panose="020B0609020204030204" pitchFamily="49" charset="0"/>
               </a:rPr>
-              <a:t>формування</a:t>
-            </a:r>
-            <a:r>
-              <a:rPr lang="ru-RU" b="0" i="0" dirty="0">
+            </a:br>
+            <a:r>
+              <a:rPr lang="en-US" sz="2800" b="0" dirty="0">
                 <a:solidFill>
-                  <a:srgbClr val="FF0000"/>
+                  <a:srgbClr val="DCDCAA"/>
                 </a:solidFill>
                 <a:effectLst/>
-                <a:latin typeface="Roboto" pitchFamily="2" charset="0"/>
+                <a:latin typeface="Consolas" panose="020B0609020204030204" pitchFamily="49" charset="0"/>
               </a:rPr>
-              <a:t> </a:t>
-            </a:r>
-            <a:r>
-              <a:rPr lang="ru-RU" b="0" i="0" dirty="0" err="1">
+              <a:t>print</a:t>
+            </a:r>
+            <a:r>
+              <a:rPr lang="en-US" sz="2800" b="0" dirty="0">
                 <a:solidFill>
-                  <a:srgbClr val="FF0000"/>
+                  <a:srgbClr val="D4D4D4"/>
                 </a:solidFill>
                 <a:effectLst/>
-                <a:latin typeface="Roboto" pitchFamily="2" charset="0"/>
+                <a:latin typeface="Consolas" panose="020B0609020204030204" pitchFamily="49" charset="0"/>
               </a:rPr>
-              <a:t>цілого</a:t>
-            </a:r>
-            <a:r>
-              <a:rPr lang="ru-RU" b="0" i="0" dirty="0">
+              <a:t>(</a:t>
+            </a:r>
+            <a:r>
+              <a:rPr lang="en-US" sz="2800" b="0" dirty="0">
                 <a:solidFill>
-                  <a:srgbClr val="FF0000"/>
+                  <a:srgbClr val="CE9178"/>
                 </a:solidFill>
                 <a:effectLst/>
-                <a:latin typeface="Roboto" pitchFamily="2" charset="0"/>
+                <a:latin typeface="Consolas" panose="020B0609020204030204" pitchFamily="49" charset="0"/>
               </a:rPr>
-              <a:t> з </a:t>
-            </a:r>
-            <a:r>
-              <a:rPr lang="ru-RU" b="0" i="0" dirty="0" err="1">
+              <a:t>"π ="</a:t>
+            </a:r>
+            <a:r>
+              <a:rPr lang="en-US" sz="2800" b="0" dirty="0">
                 <a:solidFill>
-                  <a:srgbClr val="FF0000"/>
+                  <a:srgbClr val="D4D4D4"/>
                 </a:solidFill>
                 <a:effectLst/>
-                <a:latin typeface="Roboto" pitchFamily="2" charset="0"/>
+                <a:latin typeface="Consolas" panose="020B0609020204030204" pitchFamily="49" charset="0"/>
               </a:rPr>
-              <a:t>частин</a:t>
-            </a:r>
-            <a:endParaRPr lang="LID4096" dirty="0">
-              <a:solidFill>
-                <a:srgbClr val="FF0000"/>
-              </a:solidFill>
-            </a:endParaRPr>
+              <a:t>, pi)</a:t>
+            </a:r>
+          </a:p>
+        </p:txBody>
+      </p:sp>
+      <p:sp>
+        <p:nvSpPr>
+          <p:cNvPr id="11" name="TextBox 10">
+            <a:extLst>
+              <a:ext uri="{FF2B5EF4-FFF2-40B4-BE49-F238E27FC236}">
+                <a16:creationId xmlns:a16="http://schemas.microsoft.com/office/drawing/2014/main" id="{5D78107B-3AA6-4031-A8AE-E88F1EF62827}"/>
+              </a:ext>
+            </a:extLst>
+          </p:cNvPr>
+          <p:cNvSpPr txBox="1"/>
+          <p:nvPr/>
+        </p:nvSpPr>
+        <p:spPr>
+          <a:xfrm>
+            <a:off x="1711036" y="3767809"/>
+            <a:ext cx="2618509" cy="461665"/>
+          </a:xfrm>
+          <a:prstGeom prst="rect">
+            <a:avLst/>
+          </a:prstGeom>
+          <a:noFill/>
+        </p:spPr>
+        <p:txBody>
+          <a:bodyPr wrap="square">
+            <a:spAutoFit/>
+          </a:bodyPr>
+          <a:lstStyle/>
+          <a:p>
+            <a:pPr marL="0" lvl="2">
+              <a:tabLst>
+                <a:tab pos="803275" algn="l"/>
+              </a:tabLst>
+            </a:pPr>
+            <a:r>
+              <a:rPr lang="uk-UA" sz="2400" dirty="0"/>
+              <a:t>к</a:t>
+            </a:r>
+            <a:r>
+              <a:rPr lang="ru-RU" sz="2400" dirty="0" err="1"/>
+              <a:t>рапкова</a:t>
+            </a:r>
+            <a:r>
+              <a:rPr lang="ru-RU" sz="2400" dirty="0"/>
+              <a:t> </a:t>
+            </a:r>
+            <a:r>
+              <a:rPr lang="ru-RU" sz="2400" dirty="0" err="1"/>
+              <a:t>нотація</a:t>
+            </a:r>
+            <a:r>
+              <a:rPr lang="en-US" sz="2400" dirty="0"/>
+              <a:t> </a:t>
+            </a:r>
+            <a:endParaRPr lang="ru-RU" sz="2400" dirty="0"/>
+          </a:p>
+        </p:txBody>
+      </p:sp>
+      <p:sp>
+        <p:nvSpPr>
+          <p:cNvPr id="13" name="TextBox 12">
+            <a:extLst>
+              <a:ext uri="{FF2B5EF4-FFF2-40B4-BE49-F238E27FC236}">
+                <a16:creationId xmlns:a16="http://schemas.microsoft.com/office/drawing/2014/main" id="{EBA7740D-E0CF-49E8-AFB8-3EBDE0D2D8FD}"/>
+              </a:ext>
+            </a:extLst>
+          </p:cNvPr>
+          <p:cNvSpPr txBox="1"/>
+          <p:nvPr/>
+        </p:nvSpPr>
+        <p:spPr>
+          <a:xfrm>
+            <a:off x="5525953" y="3773982"/>
+            <a:ext cx="4374017" cy="461665"/>
+          </a:xfrm>
+          <a:prstGeom prst="rect">
+            <a:avLst/>
+          </a:prstGeom>
+          <a:noFill/>
+        </p:spPr>
+        <p:txBody>
+          <a:bodyPr wrap="square">
+            <a:spAutoFit/>
+          </a:bodyPr>
+          <a:lstStyle/>
+          <a:p>
+            <a:pPr marL="0" lvl="2">
+              <a:tabLst>
+                <a:tab pos="803275" algn="l"/>
+              </a:tabLst>
+            </a:pPr>
+            <a:r>
+              <a:rPr lang="ru-RU" sz="2400" dirty="0"/>
+              <a:t>з </a:t>
+            </a:r>
+            <a:r>
+              <a:rPr lang="ru-RU" sz="2400" dirty="0" err="1"/>
+              <a:t>використанням</a:t>
+            </a:r>
+            <a:r>
+              <a:rPr lang="ru-RU" sz="2400" dirty="0"/>
+              <a:t> </a:t>
+            </a:r>
+            <a:r>
+              <a:rPr lang="uk-UA" sz="2400" dirty="0"/>
+              <a:t>інструкції </a:t>
+            </a:r>
+            <a:r>
+              <a:rPr lang="en-US" sz="2400" dirty="0"/>
+              <a:t>from</a:t>
+            </a:r>
+            <a:endParaRPr lang="LID4096" sz="2400" dirty="0"/>
+          </a:p>
+        </p:txBody>
+      </p:sp>
+      <p:sp>
+        <p:nvSpPr>
+          <p:cNvPr id="14" name="Стрелка: вниз 13">
+            <a:extLst>
+              <a:ext uri="{FF2B5EF4-FFF2-40B4-BE49-F238E27FC236}">
+                <a16:creationId xmlns:a16="http://schemas.microsoft.com/office/drawing/2014/main" id="{8C6C13E6-6552-4829-953A-E2545A596849}"/>
+              </a:ext>
+            </a:extLst>
+          </p:cNvPr>
+          <p:cNvSpPr/>
+          <p:nvPr/>
+        </p:nvSpPr>
+        <p:spPr>
+          <a:xfrm>
+            <a:off x="2895600" y="4350883"/>
+            <a:ext cx="249382" cy="352241"/>
+          </a:xfrm>
+          <a:prstGeom prst="downArrow">
+            <a:avLst/>
+          </a:prstGeom>
+          <a:noFill/>
+          <a:ln>
+            <a:solidFill>
+              <a:schemeClr val="tx1"/>
+            </a:solidFill>
+          </a:ln>
+        </p:spPr>
+        <p:style>
+          <a:lnRef idx="2">
+            <a:schemeClr val="accent1">
+              <a:shade val="50000"/>
+            </a:schemeClr>
+          </a:lnRef>
+          <a:fillRef idx="1">
+            <a:schemeClr val="accent1"/>
+          </a:fillRef>
+          <a:effectRef idx="0">
+            <a:schemeClr val="accent1"/>
+          </a:effectRef>
+          <a:fontRef idx="minor">
+            <a:schemeClr val="lt1"/>
+          </a:fontRef>
+        </p:style>
+        <p:txBody>
+          <a:bodyPr rtlCol="0" anchor="ctr"/>
+          <a:lstStyle/>
+          <a:p>
+            <a:pPr algn="ctr"/>
+            <a:endParaRPr lang="LID4096"/>
+          </a:p>
+        </p:txBody>
+      </p:sp>
+      <p:sp>
+        <p:nvSpPr>
+          <p:cNvPr id="15" name="Стрелка: вниз 14">
+            <a:extLst>
+              <a:ext uri="{FF2B5EF4-FFF2-40B4-BE49-F238E27FC236}">
+                <a16:creationId xmlns:a16="http://schemas.microsoft.com/office/drawing/2014/main" id="{11C7814F-AB72-43C6-A639-5A4E50D8041E}"/>
+              </a:ext>
+            </a:extLst>
+          </p:cNvPr>
+          <p:cNvSpPr/>
+          <p:nvPr/>
+        </p:nvSpPr>
+        <p:spPr>
+          <a:xfrm>
+            <a:off x="7588271" y="4319481"/>
+            <a:ext cx="249382" cy="352241"/>
+          </a:xfrm>
+          <a:prstGeom prst="downArrow">
+            <a:avLst/>
+          </a:prstGeom>
+          <a:noFill/>
+          <a:ln>
+            <a:solidFill>
+              <a:schemeClr val="tx1"/>
+            </a:solidFill>
+          </a:ln>
+        </p:spPr>
+        <p:style>
+          <a:lnRef idx="2">
+            <a:schemeClr val="accent1">
+              <a:shade val="50000"/>
+            </a:schemeClr>
+          </a:lnRef>
+          <a:fillRef idx="1">
+            <a:schemeClr val="accent1"/>
+          </a:fillRef>
+          <a:effectRef idx="0">
+            <a:schemeClr val="accent1"/>
+          </a:effectRef>
+          <a:fontRef idx="minor">
+            <a:schemeClr val="lt1"/>
+          </a:fontRef>
+        </p:style>
+        <p:txBody>
+          <a:bodyPr rtlCol="0" anchor="ctr"/>
+          <a:lstStyle/>
+          <a:p>
+            <a:pPr algn="ctr"/>
+            <a:endParaRPr lang="LID4096"/>
           </a:p>
         </p:txBody>
       </p:sp>
     </p:spTree>
     <p:extLst>
       <p:ext uri="{BB962C8B-B14F-4D97-AF65-F5344CB8AC3E}">
-        <p14:creationId xmlns:p14="http://schemas.microsoft.com/office/powerpoint/2010/main" val="795762372"/>
+        <p14:creationId xmlns:p14="http://schemas.microsoft.com/office/powerpoint/2010/main" val="295915108"/>
       </p:ext>
     </p:extLst>
   </p:cSld>
@@ -21806,7 +21812,7 @@
         <p:spPr>
           <a:xfrm>
             <a:off x="1024127" y="585216"/>
-            <a:ext cx="9720073" cy="1084408"/>
+            <a:ext cx="9720073" cy="1499616"/>
           </a:xfrm>
         </p:spPr>
         <p:txBody>
@@ -21816,10 +21822,10 @@
           <a:lstStyle/>
           <a:p>
             <a:r>
-              <a:rPr lang="ru-RU" sz="4800" dirty="0" err="1"/>
-              <a:t>Композиція</a:t>
-            </a:r>
-            <a:endParaRPr lang="x-none" sz="4800" dirty="0"/>
+              <a:rPr lang="uk-UA" dirty="0"/>
+              <a:t>Опрацювання виняткових ситуацій</a:t>
+            </a:r>
+            <a:endParaRPr lang="x-none" dirty="0"/>
           </a:p>
         </p:txBody>
       </p:sp>
@@ -21841,663 +21847,281 @@
         </p:nvSpPr>
         <p:spPr>
           <a:xfrm>
-            <a:off x="802454" y="1735572"/>
-            <a:ext cx="6180237" cy="4496077"/>
+            <a:off x="1024126" y="1953491"/>
+            <a:ext cx="10585983" cy="1856510"/>
           </a:xfrm>
         </p:spPr>
         <p:txBody>
           <a:bodyPr>
-            <a:normAutofit lnSpcReduction="10000"/>
+            <a:normAutofit fontScale="92500" lnSpcReduction="20000"/>
           </a:bodyPr>
           <a:lstStyle/>
           <a:p>
             <a:r>
-              <a:rPr lang="uk-UA" sz="3200" b="1" dirty="0"/>
-              <a:t>Задача</a:t>
-            </a:r>
+              <a:rPr lang="ru-RU" sz="2800" b="1" dirty="0" err="1"/>
+              <a:t>Виняток</a:t>
+            </a:r>
+            <a:r>
+              <a:rPr lang="ru-RU" sz="2800" dirty="0"/>
+              <a:t> — </a:t>
+            </a:r>
+            <a:r>
+              <a:rPr lang="ru-RU" sz="2800" dirty="0" err="1"/>
+              <a:t>це</a:t>
+            </a:r>
+            <a:r>
+              <a:rPr lang="ru-RU" sz="2800" dirty="0"/>
+              <a:t> </a:t>
+            </a:r>
+            <a:r>
+              <a:rPr lang="ru-RU" sz="2800" dirty="0" err="1"/>
+              <a:t>подія</a:t>
+            </a:r>
+            <a:r>
+              <a:rPr lang="ru-RU" sz="2800" dirty="0"/>
+              <a:t>, яка </a:t>
+            </a:r>
+            <a:r>
+              <a:rPr lang="ru-RU" sz="2800" dirty="0" err="1"/>
+              <a:t>може</a:t>
+            </a:r>
+            <a:r>
+              <a:rPr lang="ru-RU" sz="2800" dirty="0"/>
+              <a:t> </a:t>
+            </a:r>
+            <a:r>
+              <a:rPr lang="ru-RU" sz="2800" dirty="0" err="1"/>
+              <a:t>виникнути</a:t>
+            </a:r>
+            <a:r>
+              <a:rPr lang="ru-RU" sz="2800" dirty="0"/>
+              <a:t> </a:t>
+            </a:r>
+            <a:r>
+              <a:rPr lang="ru-RU" sz="2800" dirty="0" err="1"/>
+              <a:t>під</a:t>
+            </a:r>
+            <a:r>
+              <a:rPr lang="ru-RU" sz="2800" dirty="0"/>
+              <a:t> час </a:t>
+            </a:r>
+            <a:r>
+              <a:rPr lang="ru-RU" sz="2800" dirty="0" err="1"/>
+              <a:t>виконання</a:t>
+            </a:r>
+            <a:r>
+              <a:rPr lang="ru-RU" sz="2800" dirty="0"/>
+              <a:t> </a:t>
+            </a:r>
+            <a:r>
+              <a:rPr lang="ru-RU" sz="2800" dirty="0" err="1"/>
+              <a:t>програми</a:t>
+            </a:r>
+            <a:r>
+              <a:rPr lang="ru-RU" sz="2800" dirty="0"/>
+              <a:t> й яка </a:t>
+            </a:r>
+            <a:r>
+              <a:rPr lang="ru-RU" sz="2800" dirty="0" err="1"/>
+              <a:t>може</a:t>
+            </a:r>
+            <a:r>
+              <a:rPr lang="ru-RU" sz="2800" dirty="0"/>
+              <a:t> </a:t>
+            </a:r>
+            <a:r>
+              <a:rPr lang="ru-RU" sz="2800" dirty="0" err="1"/>
+              <a:t>змінити</a:t>
+            </a:r>
+            <a:r>
+              <a:rPr lang="ru-RU" sz="2800" dirty="0"/>
+              <a:t> </a:t>
+            </a:r>
+            <a:r>
+              <a:rPr lang="ru-RU" sz="2800" dirty="0" err="1"/>
+              <a:t>подальший</a:t>
+            </a:r>
+            <a:r>
+              <a:rPr lang="ru-RU" sz="2800" dirty="0"/>
+              <a:t> </a:t>
+            </a:r>
+            <a:r>
+              <a:rPr lang="ru-RU" sz="2800" dirty="0" err="1"/>
+              <a:t>хід</a:t>
+            </a:r>
+            <a:r>
+              <a:rPr lang="ru-RU" sz="2800" dirty="0"/>
+              <a:t> </a:t>
+            </a:r>
+            <a:r>
+              <a:rPr lang="ru-RU" sz="2800" dirty="0" err="1"/>
+              <a:t>її</a:t>
+            </a:r>
+            <a:r>
+              <a:rPr lang="ru-RU" sz="2800" dirty="0"/>
+              <a:t> </a:t>
+            </a:r>
+            <a:r>
+              <a:rPr lang="ru-RU" sz="2800" dirty="0" err="1"/>
+              <a:t>виконання</a:t>
+            </a:r>
+            <a:r>
+              <a:rPr lang="ru-RU" sz="2800" dirty="0"/>
+              <a:t>.</a:t>
+            </a:r>
+            <a:endParaRPr lang="en-US" sz="2800" dirty="0"/>
           </a:p>
           <a:p>
             <a:r>
-              <a:rPr lang="ru-RU" sz="3200" dirty="0"/>
-              <a:t>На </a:t>
-            </a:r>
-            <a:r>
-              <a:rPr lang="ru-RU" sz="3200" dirty="0" err="1"/>
-              <a:t>аркуші</a:t>
-            </a:r>
-            <a:r>
-              <a:rPr lang="ru-RU" sz="3200" dirty="0"/>
+              <a:rPr lang="ru-RU" sz="2800" dirty="0" err="1"/>
+              <a:t>Винятки</a:t>
+            </a:r>
+            <a:r>
+              <a:rPr lang="ru-RU" sz="2800" dirty="0"/>
               <a:t> </a:t>
             </a:r>
             <a:r>
-              <a:rPr lang="ru-RU" sz="3200" dirty="0" err="1"/>
-              <a:t>паперу</a:t>
-            </a:r>
-            <a:r>
-              <a:rPr lang="ru-RU" sz="3200" dirty="0"/>
-              <a:t> з </a:t>
-            </a:r>
-            <a:r>
-              <a:rPr lang="ru-RU" sz="3200" dirty="0" err="1"/>
-              <a:t>відомими</a:t>
-            </a:r>
-            <a:r>
-              <a:rPr lang="ru-RU" sz="3200" dirty="0"/>
+              <a:rPr lang="ru-RU" sz="2800" dirty="0" err="1"/>
+              <a:t>генеруються</a:t>
+            </a:r>
+            <a:r>
+              <a:rPr lang="ru-RU" sz="2800" dirty="0"/>
+              <a:t> автоматично, коли, </a:t>
+            </a:r>
+            <a:r>
+              <a:rPr lang="ru-RU" sz="2800" dirty="0" err="1"/>
+              <a:t>наприклад</a:t>
+            </a:r>
+            <a:r>
+              <a:rPr lang="ru-RU" sz="2800" dirty="0"/>
+              <a:t>, у </a:t>
+            </a:r>
+            <a:r>
+              <a:rPr lang="ru-RU" sz="2800" dirty="0" err="1"/>
+              <a:t>програмному</a:t>
+            </a:r>
+            <a:r>
+              <a:rPr lang="ru-RU" sz="2800" dirty="0"/>
               <a:t> </a:t>
             </a:r>
             <a:r>
-              <a:rPr lang="ru-RU" sz="3200" dirty="0" err="1"/>
-              <a:t>розмірами</a:t>
-            </a:r>
-            <a:r>
-              <a:rPr lang="ru-RU" sz="3200" dirty="0"/>
+              <a:rPr lang="ru-RU" sz="2800" dirty="0" err="1"/>
+              <a:t>коді</a:t>
+            </a:r>
+            <a:r>
+              <a:rPr lang="ru-RU" sz="2800" dirty="0"/>
               <a:t> </a:t>
             </a:r>
             <a:r>
-              <a:rPr lang="ru-RU" sz="3200" dirty="0" err="1"/>
-              <a:t>накреслено</a:t>
-            </a:r>
-            <a:r>
-              <a:rPr lang="ru-RU" sz="3200" dirty="0"/>
-              <a:t> два кола </a:t>
-            </a:r>
-            <a:r>
-              <a:rPr lang="ru-RU" sz="3200" dirty="0" err="1"/>
-              <a:t>радіусом</a:t>
-            </a:r>
-            <a:r>
-              <a:rPr lang="ru-RU" sz="3200" dirty="0"/>
-              <a:t> r1, два кола </a:t>
-            </a:r>
-            <a:r>
-              <a:rPr lang="ru-RU" sz="3200" dirty="0" err="1"/>
-              <a:t>радіусом</a:t>
-            </a:r>
-            <a:r>
-              <a:rPr lang="ru-RU" sz="3200" dirty="0"/>
-              <a:t> r2 та один </a:t>
-            </a:r>
-            <a:r>
-              <a:rPr lang="ru-RU" sz="3200" dirty="0" err="1"/>
-              <a:t>рівносторонній</a:t>
-            </a:r>
-            <a:r>
-              <a:rPr lang="ru-RU" sz="3200" dirty="0"/>
+              <a:rPr lang="ru-RU" sz="2800" dirty="0" err="1"/>
+              <a:t>виникає</a:t>
+            </a:r>
+            <a:r>
+              <a:rPr lang="ru-RU" sz="2800" dirty="0"/>
               <a:t> </a:t>
             </a:r>
             <a:r>
-              <a:rPr lang="ru-RU" sz="3200" dirty="0" err="1"/>
-              <a:t>трикутник</a:t>
-            </a:r>
-            <a:r>
-              <a:rPr lang="ru-RU" sz="3200" dirty="0"/>
+              <a:rPr lang="ru-RU" sz="2800" dirty="0" err="1"/>
+              <a:t>помилка</a:t>
+            </a:r>
+            <a:r>
+              <a:rPr lang="ru-RU" sz="2800" dirty="0"/>
+              <a:t> (</a:t>
+            </a:r>
+            <a:r>
+              <a:rPr lang="ru-RU" sz="2800" dirty="0" err="1"/>
+              <a:t>ділення</a:t>
+            </a:r>
+            <a:r>
+              <a:rPr lang="ru-RU" sz="2800" dirty="0"/>
+              <a:t> на нуль, </a:t>
+            </a:r>
+            <a:r>
+              <a:rPr lang="ru-RU" sz="2800" dirty="0" err="1"/>
+              <a:t>вихід</a:t>
+            </a:r>
+            <a:r>
+              <a:rPr lang="ru-RU" sz="2800" dirty="0"/>
               <a:t> </a:t>
             </a:r>
             <a:r>
-              <a:rPr lang="ru-RU" sz="3200" dirty="0" err="1"/>
-              <a:t>зі</a:t>
-            </a:r>
-            <a:r>
-              <a:rPr lang="ru-RU" sz="3200" dirty="0"/>
-              <a:t> стороною а. </a:t>
-            </a:r>
-            <a:r>
-              <a:rPr lang="ru-RU" sz="3200" dirty="0" err="1"/>
-              <a:t>Усі</a:t>
-            </a:r>
-            <a:r>
-              <a:rPr lang="ru-RU" sz="3200" dirty="0"/>
+              <a:rPr lang="ru-RU" sz="2800" dirty="0" err="1"/>
+              <a:t>індексу</a:t>
+            </a:r>
+            <a:r>
+              <a:rPr lang="ru-RU" sz="2800" dirty="0"/>
               <a:t> </a:t>
             </a:r>
             <a:r>
-              <a:rPr lang="ru-RU" sz="3200" dirty="0" err="1"/>
-              <a:t>ці</a:t>
-            </a:r>
-            <a:r>
-              <a:rPr lang="ru-RU" sz="3200" dirty="0"/>
-              <a:t> </a:t>
-            </a:r>
-            <a:r>
-              <a:rPr lang="ru-RU" sz="3200" dirty="0" err="1"/>
-              <a:t>фігури</a:t>
-            </a:r>
-            <a:r>
-              <a:rPr lang="ru-RU" sz="3200" dirty="0"/>
-              <a:t> не </a:t>
-            </a:r>
-            <a:r>
-              <a:rPr lang="ru-RU" sz="3200" dirty="0" err="1"/>
-              <a:t>перетинаються</a:t>
-            </a:r>
-            <a:r>
-              <a:rPr lang="ru-RU" sz="3200" dirty="0"/>
-              <a:t> одна з одною. </a:t>
-            </a:r>
-            <a:r>
-              <a:rPr lang="ru-RU" sz="3200" dirty="0" err="1"/>
-              <a:t>Необхідно</a:t>
-            </a:r>
-            <a:r>
-              <a:rPr lang="ru-RU" sz="3200" dirty="0"/>
-              <a:t> </a:t>
-            </a:r>
-            <a:r>
-              <a:rPr lang="ru-RU" sz="3200" dirty="0" err="1"/>
-              <a:t>обчислити</a:t>
-            </a:r>
-            <a:r>
-              <a:rPr lang="ru-RU" sz="3200" dirty="0"/>
-              <a:t> </a:t>
-            </a:r>
-            <a:r>
-              <a:rPr lang="ru-RU" sz="3200" dirty="0" err="1"/>
-              <a:t>загальну</a:t>
-            </a:r>
-            <a:r>
-              <a:rPr lang="ru-RU" sz="3200" dirty="0"/>
-              <a:t> </a:t>
-            </a:r>
-            <a:r>
-              <a:rPr lang="ru-RU" sz="3200" dirty="0" err="1"/>
-              <a:t>площу</a:t>
-            </a:r>
-            <a:r>
-              <a:rPr lang="ru-RU" sz="3200" dirty="0"/>
-              <a:t> </a:t>
-            </a:r>
-            <a:r>
-              <a:rPr lang="ru-RU" sz="3200" dirty="0" err="1"/>
-              <a:t>аркуша</a:t>
-            </a:r>
-            <a:r>
-              <a:rPr lang="ru-RU" sz="3200" dirty="0"/>
-              <a:t> </a:t>
-            </a:r>
-            <a:r>
-              <a:rPr lang="ru-RU" sz="3200" dirty="0" err="1"/>
-              <a:t>паперу</a:t>
-            </a:r>
-            <a:r>
-              <a:rPr lang="ru-RU" sz="3200" dirty="0"/>
+              <a:rPr lang="ru-RU" sz="2800" dirty="0" err="1"/>
+              <a:t>масиву</a:t>
+            </a:r>
+            <a:r>
+              <a:rPr lang="ru-RU" sz="2800" dirty="0"/>
+              <a:t> за </a:t>
+            </a:r>
+            <a:r>
+              <a:rPr lang="ru-RU" sz="2800" dirty="0" err="1"/>
+              <a:t>межі</a:t>
+            </a:r>
+            <a:r>
+              <a:rPr lang="ru-RU" sz="2800" dirty="0"/>
+              <a:t> допустимого </a:t>
+            </a:r>
+            <a:r>
+              <a:rPr lang="ru-RU" sz="2800" dirty="0" err="1"/>
+              <a:t>значення</a:t>
+            </a:r>
+            <a:r>
+              <a:rPr lang="ru-RU" sz="2800" dirty="0"/>
               <a:t> й </a:t>
             </a:r>
             <a:r>
-              <a:rPr lang="ru-RU" sz="3200" dirty="0" err="1"/>
-              <a:t>залишок</a:t>
-            </a:r>
-            <a:r>
-              <a:rPr lang="ru-RU" sz="3200" dirty="0"/>
-              <a:t> </a:t>
-            </a:r>
-            <a:r>
-              <a:rPr lang="ru-RU" sz="3200" dirty="0" err="1"/>
-              <a:t>площі</a:t>
-            </a:r>
-            <a:r>
-              <a:rPr lang="ru-RU" sz="3200" dirty="0"/>
-              <a:t> </a:t>
-            </a:r>
-            <a:r>
-              <a:rPr lang="ru-RU" sz="3200" dirty="0" err="1"/>
-              <a:t>аркуша</a:t>
-            </a:r>
-            <a:r>
-              <a:rPr lang="ru-RU" sz="3200" dirty="0"/>
-              <a:t>.</a:t>
-            </a:r>
-            <a:endParaRPr lang="LID4096" sz="3200" dirty="0"/>
+              <a:rPr lang="ru-RU" sz="2800" dirty="0" err="1"/>
+              <a:t>ін</a:t>
+            </a:r>
+            <a:r>
+              <a:rPr lang="ru-RU" sz="2800" dirty="0"/>
+              <a:t>.).</a:t>
+            </a:r>
+            <a:endParaRPr lang="LID4096" sz="2800" dirty="0"/>
           </a:p>
         </p:txBody>
       </p:sp>
-      <p:sp>
-        <p:nvSpPr>
-          <p:cNvPr id="2" name="Прямоугольник 1">
+      <p:pic>
+        <p:nvPicPr>
+          <p:cNvPr id="3" name="Рисунок 2">
             <a:extLst>
               <a:ext uri="{FF2B5EF4-FFF2-40B4-BE49-F238E27FC236}">
-                <a16:creationId xmlns:a16="http://schemas.microsoft.com/office/drawing/2014/main" id="{3CDB2E63-7D84-469B-B8CD-5A63E2C07F5A}"/>
+                <a16:creationId xmlns:a16="http://schemas.microsoft.com/office/drawing/2014/main" id="{552A8C80-0A7F-4A20-A2B5-4799D6A1DCAE}"/>
               </a:ext>
             </a:extLst>
           </p:cNvPr>
-          <p:cNvSpPr/>
+          <p:cNvPicPr>
+            <a:picLocks noChangeAspect="1"/>
+          </p:cNvPicPr>
           <p:nvPr/>
-        </p:nvSpPr>
+        </p:nvPicPr>
+        <p:blipFill>
+          <a:blip r:embed="rId2"/>
+          <a:stretch>
+            <a:fillRect/>
+          </a:stretch>
+        </p:blipFill>
         <p:spPr>
           <a:xfrm>
-            <a:off x="7481455" y="1537855"/>
-            <a:ext cx="3262745" cy="3235314"/>
+            <a:off x="1119828" y="3799472"/>
+            <a:ext cx="9952343" cy="2462783"/>
           </a:xfrm>
           <a:prstGeom prst="rect">
             <a:avLst/>
           </a:prstGeom>
-          <a:noFill/>
         </p:spPr>
-        <p:style>
-          <a:lnRef idx="2">
-            <a:schemeClr val="accent1">
-              <a:shade val="50000"/>
-            </a:schemeClr>
-          </a:lnRef>
-          <a:fillRef idx="1">
-            <a:schemeClr val="accent1"/>
-          </a:fillRef>
-          <a:effectRef idx="0">
-            <a:schemeClr val="accent1"/>
-          </a:effectRef>
-          <a:fontRef idx="minor">
-            <a:schemeClr val="lt1"/>
-          </a:fontRef>
-        </p:style>
-        <p:txBody>
-          <a:bodyPr rtlCol="0" anchor="ctr"/>
-          <a:lstStyle/>
-          <a:p>
-            <a:pPr algn="ctr"/>
-            <a:endParaRPr lang="LID4096"/>
-          </a:p>
-        </p:txBody>
-      </p:sp>
-      <p:sp>
-        <p:nvSpPr>
-          <p:cNvPr id="3" name="Овал 2">
-            <a:extLst>
-              <a:ext uri="{FF2B5EF4-FFF2-40B4-BE49-F238E27FC236}">
-                <a16:creationId xmlns:a16="http://schemas.microsoft.com/office/drawing/2014/main" id="{CE2430A2-5B57-454A-B23A-DB812A977BFB}"/>
-              </a:ext>
-            </a:extLst>
-          </p:cNvPr>
-          <p:cNvSpPr/>
-          <p:nvPr/>
-        </p:nvSpPr>
-        <p:spPr>
-          <a:xfrm>
-            <a:off x="7980218" y="1898073"/>
-            <a:ext cx="1108364" cy="1108364"/>
-          </a:xfrm>
-          <a:prstGeom prst="ellipse">
-            <a:avLst/>
-          </a:prstGeom>
-          <a:noFill/>
-          <a:ln>
-            <a:solidFill>
-              <a:srgbClr val="002060"/>
-            </a:solidFill>
-          </a:ln>
-        </p:spPr>
-        <p:style>
-          <a:lnRef idx="2">
-            <a:schemeClr val="accent1">
-              <a:shade val="50000"/>
-            </a:schemeClr>
-          </a:lnRef>
-          <a:fillRef idx="1">
-            <a:schemeClr val="accent1"/>
-          </a:fillRef>
-          <a:effectRef idx="0">
-            <a:schemeClr val="accent1"/>
-          </a:effectRef>
-          <a:fontRef idx="minor">
-            <a:schemeClr val="lt1"/>
-          </a:fontRef>
-        </p:style>
-        <p:txBody>
-          <a:bodyPr rtlCol="0" anchor="ctr"/>
-          <a:lstStyle/>
-          <a:p>
-            <a:pPr algn="ctr"/>
-            <a:endParaRPr lang="LID4096"/>
-          </a:p>
-        </p:txBody>
-      </p:sp>
-      <p:sp>
-        <p:nvSpPr>
-          <p:cNvPr id="5" name="Овал 4">
-            <a:extLst>
-              <a:ext uri="{FF2B5EF4-FFF2-40B4-BE49-F238E27FC236}">
-                <a16:creationId xmlns:a16="http://schemas.microsoft.com/office/drawing/2014/main" id="{4881356C-0268-4A13-9503-77C05C89A1A2}"/>
-              </a:ext>
-            </a:extLst>
-          </p:cNvPr>
-          <p:cNvSpPr/>
-          <p:nvPr/>
-        </p:nvSpPr>
-        <p:spPr>
-          <a:xfrm>
-            <a:off x="9476509" y="3037471"/>
-            <a:ext cx="831273" cy="831273"/>
-          </a:xfrm>
-          <a:prstGeom prst="ellipse">
-            <a:avLst/>
-          </a:prstGeom>
-          <a:noFill/>
-          <a:ln>
-            <a:solidFill>
-              <a:srgbClr val="002060"/>
-            </a:solidFill>
-          </a:ln>
-        </p:spPr>
-        <p:style>
-          <a:lnRef idx="2">
-            <a:schemeClr val="accent1">
-              <a:shade val="50000"/>
-            </a:schemeClr>
-          </a:lnRef>
-          <a:fillRef idx="1">
-            <a:schemeClr val="accent1"/>
-          </a:fillRef>
-          <a:effectRef idx="0">
-            <a:schemeClr val="accent1"/>
-          </a:effectRef>
-          <a:fontRef idx="minor">
-            <a:schemeClr val="lt1"/>
-          </a:fontRef>
-        </p:style>
-        <p:txBody>
-          <a:bodyPr rtlCol="0" anchor="ctr"/>
-          <a:lstStyle/>
-          <a:p>
-            <a:pPr algn="ctr"/>
-            <a:endParaRPr lang="LID4096"/>
-          </a:p>
-        </p:txBody>
-      </p:sp>
-      <p:sp>
-        <p:nvSpPr>
-          <p:cNvPr id="6" name="Равнобедренный треугольник 5">
-            <a:extLst>
-              <a:ext uri="{FF2B5EF4-FFF2-40B4-BE49-F238E27FC236}">
-                <a16:creationId xmlns:a16="http://schemas.microsoft.com/office/drawing/2014/main" id="{CAE9690E-6934-4ED1-8594-BFE173A526B0}"/>
-              </a:ext>
-            </a:extLst>
-          </p:cNvPr>
-          <p:cNvSpPr/>
-          <p:nvPr/>
-        </p:nvSpPr>
-        <p:spPr>
-          <a:xfrm>
-            <a:off x="7855527" y="3602182"/>
-            <a:ext cx="964277" cy="831273"/>
-          </a:xfrm>
-          <a:prstGeom prst="triangle">
-            <a:avLst/>
-          </a:prstGeom>
-          <a:noFill/>
-          <a:ln>
-            <a:solidFill>
-              <a:srgbClr val="002060"/>
-            </a:solidFill>
-          </a:ln>
-        </p:spPr>
-        <p:style>
-          <a:lnRef idx="2">
-            <a:schemeClr val="accent1">
-              <a:shade val="50000"/>
-            </a:schemeClr>
-          </a:lnRef>
-          <a:fillRef idx="1">
-            <a:schemeClr val="accent1"/>
-          </a:fillRef>
-          <a:effectRef idx="0">
-            <a:schemeClr val="accent1"/>
-          </a:effectRef>
-          <a:fontRef idx="minor">
-            <a:schemeClr val="lt1"/>
-          </a:fontRef>
-        </p:style>
-        <p:txBody>
-          <a:bodyPr rtlCol="0" anchor="ctr"/>
-          <a:lstStyle/>
-          <a:p>
-            <a:pPr algn="ctr"/>
-            <a:endParaRPr lang="LID4096"/>
-          </a:p>
-        </p:txBody>
-      </p:sp>
-      <p:cxnSp>
-        <p:nvCxnSpPr>
-          <p:cNvPr id="9" name="Прямая со стрелкой 8">
-            <a:extLst>
-              <a:ext uri="{FF2B5EF4-FFF2-40B4-BE49-F238E27FC236}">
-                <a16:creationId xmlns:a16="http://schemas.microsoft.com/office/drawing/2014/main" id="{A61F771E-5A70-4727-A390-60E041A3C2F8}"/>
-              </a:ext>
-            </a:extLst>
-          </p:cNvPr>
-          <p:cNvCxnSpPr>
-            <a:stCxn id="3" idx="1"/>
-            <a:endCxn id="3" idx="5"/>
-          </p:cNvCxnSpPr>
-          <p:nvPr/>
-        </p:nvCxnSpPr>
-        <p:spPr>
-          <a:xfrm>
-            <a:off x="8142534" y="2060389"/>
-            <a:ext cx="783732" cy="783732"/>
-          </a:xfrm>
-          <a:prstGeom prst="straightConnector1">
-            <a:avLst/>
-          </a:prstGeom>
-          <a:ln>
-            <a:solidFill>
-              <a:srgbClr val="002060"/>
-            </a:solidFill>
-            <a:headEnd type="triangle"/>
-            <a:tailEnd type="triangle"/>
-          </a:ln>
-        </p:spPr>
-        <p:style>
-          <a:lnRef idx="1">
-            <a:schemeClr val="dk1"/>
-          </a:lnRef>
-          <a:fillRef idx="0">
-            <a:schemeClr val="dk1"/>
-          </a:fillRef>
-          <a:effectRef idx="0">
-            <a:schemeClr val="dk1"/>
-          </a:effectRef>
-          <a:fontRef idx="minor">
-            <a:schemeClr val="tx1"/>
-          </a:fontRef>
-        </p:style>
-      </p:cxnSp>
-      <p:cxnSp>
-        <p:nvCxnSpPr>
-          <p:cNvPr id="12" name="Прямая со стрелкой 11">
-            <a:extLst>
-              <a:ext uri="{FF2B5EF4-FFF2-40B4-BE49-F238E27FC236}">
-                <a16:creationId xmlns:a16="http://schemas.microsoft.com/office/drawing/2014/main" id="{2DADCA5D-A874-448C-AC8E-B7931B4AA32E}"/>
-              </a:ext>
-            </a:extLst>
-          </p:cNvPr>
-          <p:cNvCxnSpPr>
-            <a:stCxn id="5" idx="7"/>
-            <a:endCxn id="5" idx="3"/>
-          </p:cNvCxnSpPr>
-          <p:nvPr/>
-        </p:nvCxnSpPr>
-        <p:spPr>
-          <a:xfrm flipH="1">
-            <a:off x="9598246" y="3159208"/>
-            <a:ext cx="587799" cy="587799"/>
-          </a:xfrm>
-          <a:prstGeom prst="straightConnector1">
-            <a:avLst/>
-          </a:prstGeom>
-          <a:ln>
-            <a:headEnd type="triangle"/>
-            <a:tailEnd type="triangle"/>
-          </a:ln>
-        </p:spPr>
-        <p:style>
-          <a:lnRef idx="1">
-            <a:schemeClr val="accent1"/>
-          </a:lnRef>
-          <a:fillRef idx="0">
-            <a:schemeClr val="accent1"/>
-          </a:fillRef>
-          <a:effectRef idx="0">
-            <a:schemeClr val="accent1"/>
-          </a:effectRef>
-          <a:fontRef idx="minor">
-            <a:schemeClr val="tx1"/>
-          </a:fontRef>
-        </p:style>
-      </p:cxnSp>
-      <p:sp>
-        <p:nvSpPr>
-          <p:cNvPr id="13" name="TextBox 12">
-            <a:extLst>
-              <a:ext uri="{FF2B5EF4-FFF2-40B4-BE49-F238E27FC236}">
-                <a16:creationId xmlns:a16="http://schemas.microsoft.com/office/drawing/2014/main" id="{5EB89E4F-2F44-487C-9C08-F3ABF93ECAC4}"/>
-              </a:ext>
-            </a:extLst>
-          </p:cNvPr>
-          <p:cNvSpPr txBox="1"/>
-          <p:nvPr/>
-        </p:nvSpPr>
-        <p:spPr>
-          <a:xfrm>
-            <a:off x="8556770" y="3747007"/>
-            <a:ext cx="311304" cy="369332"/>
-          </a:xfrm>
-          <a:prstGeom prst="rect">
-            <a:avLst/>
-          </a:prstGeom>
-          <a:noFill/>
-        </p:spPr>
-        <p:txBody>
-          <a:bodyPr wrap="none" rtlCol="0">
-            <a:spAutoFit/>
-          </a:bodyPr>
-          <a:lstStyle/>
-          <a:p>
-            <a:r>
-              <a:rPr lang="en-US" dirty="0"/>
-              <a:t>a</a:t>
-            </a:r>
-            <a:endParaRPr lang="LID4096" dirty="0"/>
-          </a:p>
-        </p:txBody>
-      </p:sp>
-      <p:sp>
-        <p:nvSpPr>
-          <p:cNvPr id="14" name="TextBox 13">
-            <a:extLst>
-              <a:ext uri="{FF2B5EF4-FFF2-40B4-BE49-F238E27FC236}">
-                <a16:creationId xmlns:a16="http://schemas.microsoft.com/office/drawing/2014/main" id="{A5D2510B-6162-4F3F-BB0D-C38145FCB6D8}"/>
-              </a:ext>
-            </a:extLst>
-          </p:cNvPr>
-          <p:cNvSpPr txBox="1"/>
-          <p:nvPr/>
-        </p:nvSpPr>
-        <p:spPr>
-          <a:xfrm>
-            <a:off x="8575964" y="2221898"/>
-            <a:ext cx="388248" cy="369332"/>
-          </a:xfrm>
-          <a:prstGeom prst="rect">
-            <a:avLst/>
-          </a:prstGeom>
-          <a:noFill/>
-        </p:spPr>
-        <p:txBody>
-          <a:bodyPr wrap="none" rtlCol="0">
-            <a:spAutoFit/>
-          </a:bodyPr>
-          <a:lstStyle/>
-          <a:p>
-            <a:r>
-              <a:rPr lang="en-US" dirty="0"/>
-              <a:t>r1</a:t>
-            </a:r>
-            <a:endParaRPr lang="LID4096" dirty="0"/>
-          </a:p>
-        </p:txBody>
-      </p:sp>
-      <p:sp>
-        <p:nvSpPr>
-          <p:cNvPr id="15" name="TextBox 14">
-            <a:extLst>
-              <a:ext uri="{FF2B5EF4-FFF2-40B4-BE49-F238E27FC236}">
-                <a16:creationId xmlns:a16="http://schemas.microsoft.com/office/drawing/2014/main" id="{3E6CF3E6-2D67-4DB2-8016-0B102DEF88B0}"/>
-              </a:ext>
-            </a:extLst>
-          </p:cNvPr>
-          <p:cNvSpPr txBox="1"/>
-          <p:nvPr/>
-        </p:nvSpPr>
-        <p:spPr>
-          <a:xfrm>
-            <a:off x="9598246" y="3155512"/>
-            <a:ext cx="388248" cy="369332"/>
-          </a:xfrm>
-          <a:prstGeom prst="rect">
-            <a:avLst/>
-          </a:prstGeom>
-          <a:noFill/>
-        </p:spPr>
-        <p:txBody>
-          <a:bodyPr wrap="none" rtlCol="0">
-            <a:spAutoFit/>
-          </a:bodyPr>
-          <a:lstStyle/>
-          <a:p>
-            <a:r>
-              <a:rPr lang="en-US" dirty="0"/>
-              <a:t>r2</a:t>
-            </a:r>
-            <a:endParaRPr lang="LID4096" dirty="0"/>
-          </a:p>
-        </p:txBody>
-      </p:sp>
-      <p:cxnSp>
-        <p:nvCxnSpPr>
-          <p:cNvPr id="17" name="Прямая со стрелкой 16">
-            <a:extLst>
-              <a:ext uri="{FF2B5EF4-FFF2-40B4-BE49-F238E27FC236}">
-                <a16:creationId xmlns:a16="http://schemas.microsoft.com/office/drawing/2014/main" id="{1B4FC9DB-E824-48DB-89CD-F1B90499BB0F}"/>
-              </a:ext>
-            </a:extLst>
-          </p:cNvPr>
-          <p:cNvCxnSpPr>
-            <a:cxnSpLocks/>
-          </p:cNvCxnSpPr>
-          <p:nvPr/>
-        </p:nvCxnSpPr>
-        <p:spPr>
-          <a:xfrm>
-            <a:off x="8373685" y="3567679"/>
-            <a:ext cx="491709" cy="853816"/>
-          </a:xfrm>
-          <a:prstGeom prst="straightConnector1">
-            <a:avLst/>
-          </a:prstGeom>
-          <a:ln>
-            <a:solidFill>
-              <a:srgbClr val="002060"/>
-            </a:solidFill>
-            <a:headEnd type="triangle"/>
-            <a:tailEnd type="triangle"/>
-          </a:ln>
-        </p:spPr>
-        <p:style>
-          <a:lnRef idx="1">
-            <a:schemeClr val="dk1"/>
-          </a:lnRef>
-          <a:fillRef idx="0">
-            <a:schemeClr val="dk1"/>
-          </a:fillRef>
-          <a:effectRef idx="0">
-            <a:schemeClr val="dk1"/>
-          </a:effectRef>
-          <a:fontRef idx="minor">
-            <a:schemeClr val="tx1"/>
-          </a:fontRef>
-        </p:style>
-      </p:cxnSp>
+      </p:pic>
     </p:spTree>
     <p:extLst>
       <p:ext uri="{BB962C8B-B14F-4D97-AF65-F5344CB8AC3E}">
-        <p14:creationId xmlns:p14="http://schemas.microsoft.com/office/powerpoint/2010/main" val="6876830"/>
+        <p14:creationId xmlns:p14="http://schemas.microsoft.com/office/powerpoint/2010/main" val="455102046"/>
       </p:ext>
     </p:extLst>
   </p:cSld>
@@ -22526,10 +22150,10 @@
       </p:grpSpPr>
       <p:sp>
         <p:nvSpPr>
-          <p:cNvPr id="4" name="Объект 3">
+          <p:cNvPr id="7" name="Заголовок 6">
             <a:extLst>
               <a:ext uri="{FF2B5EF4-FFF2-40B4-BE49-F238E27FC236}">
-                <a16:creationId xmlns:a16="http://schemas.microsoft.com/office/drawing/2014/main" id="{1E593413-B09B-4BE6-9B0B-7A1222FCE984}"/>
+                <a16:creationId xmlns:a16="http://schemas.microsoft.com/office/drawing/2014/main" id="{15584F7D-327D-4CAD-B154-E15101499BDA}"/>
               </a:ext>
             </a:extLst>
           </p:cNvPr>
@@ -22537,132 +22161,705 @@
             <a:spLocks noGrp="1"/>
           </p:cNvSpPr>
           <p:nvPr>
-            <p:ph idx="4294967295"/>
+            <p:ph type="title"/>
           </p:nvPr>
         </p:nvSpPr>
         <p:spPr>
           <a:xfrm>
-            <a:off x="360218" y="221674"/>
-            <a:ext cx="11526982" cy="374072"/>
+            <a:off x="1024127" y="585216"/>
+            <a:ext cx="9720073" cy="1499616"/>
           </a:xfrm>
         </p:spPr>
         <p:txBody>
           <a:bodyPr>
-            <a:noAutofit/>
+            <a:normAutofit/>
           </a:bodyPr>
           <a:lstStyle/>
           <a:p>
             <a:r>
-              <a:rPr lang="uk-UA" sz="3600" b="1" dirty="0"/>
-              <a:t>Розв’язання з використанням композиційного підходу</a:t>
-            </a:r>
+              <a:rPr lang="uk-UA" dirty="0"/>
+              <a:t>Опрацювання виняткових ситуацій</a:t>
+            </a:r>
+            <a:endParaRPr lang="x-none" dirty="0"/>
           </a:p>
         </p:txBody>
       </p:sp>
-      <p:pic>
-        <p:nvPicPr>
-          <p:cNvPr id="10" name="Рисунок 9">
+      <p:sp>
+        <p:nvSpPr>
+          <p:cNvPr id="5" name="TextBox 4">
             <a:extLst>
               <a:ext uri="{FF2B5EF4-FFF2-40B4-BE49-F238E27FC236}">
-                <a16:creationId xmlns:a16="http://schemas.microsoft.com/office/drawing/2014/main" id="{8F5E15EB-A5F7-4BF3-AFEB-FD921BEB078A}"/>
+                <a16:creationId xmlns:a16="http://schemas.microsoft.com/office/drawing/2014/main" id="{594390D9-4661-473D-B1DE-91CA191EFC89}"/>
               </a:ext>
             </a:extLst>
           </p:cNvPr>
-          <p:cNvPicPr>
-            <a:picLocks noChangeAspect="1"/>
-          </p:cNvPicPr>
+          <p:cNvSpPr txBox="1"/>
           <p:nvPr/>
-        </p:nvPicPr>
-        <p:blipFill>
-          <a:blip r:embed="rId3"/>
-          <a:stretch>
-            <a:fillRect/>
-          </a:stretch>
-        </p:blipFill>
+        </p:nvSpPr>
         <p:spPr>
           <a:xfrm>
-            <a:off x="2200890" y="1108364"/>
-            <a:ext cx="7790220" cy="5659625"/>
+            <a:off x="1205345" y="2202874"/>
+            <a:ext cx="9351819" cy="4524315"/>
           </a:xfrm>
           <a:prstGeom prst="rect">
             <a:avLst/>
           </a:prstGeom>
+          <a:solidFill>
+            <a:schemeClr val="tx1"/>
+          </a:solidFill>
         </p:spPr>
-      </p:pic>
-      <p:graphicFrame>
-        <p:nvGraphicFramePr>
-          <p:cNvPr id="16" name="Объект 15">
-            <a:hlinkClick r:id="rId4" action="ppaction://hlinkfile"/>
-            <a:extLst>
-              <a:ext uri="{FF2B5EF4-FFF2-40B4-BE49-F238E27FC236}">
-                <a16:creationId xmlns:a16="http://schemas.microsoft.com/office/drawing/2014/main" id="{AEE9143E-52A4-4DB6-AB86-F25D5E4D0067}"/>
-              </a:ext>
-            </a:extLst>
-          </p:cNvPr>
-          <p:cNvGraphicFramePr>
-            <a:graphicFrameLocks noChangeAspect="1"/>
-          </p:cNvGraphicFramePr>
-          <p:nvPr>
-            <p:extLst>
-              <p:ext uri="{D42A27DB-BD31-4B8C-83A1-F6EECF244321}">
-                <p14:modId xmlns:p14="http://schemas.microsoft.com/office/powerpoint/2010/main" val="2501139132"/>
-              </p:ext>
-            </p:extLst>
-          </p:nvPr>
-        </p:nvGraphicFramePr>
-        <p:xfrm>
-          <a:off x="9882519" y="5015345"/>
-          <a:ext cx="1838427" cy="1276570"/>
-        </p:xfrm>
-        <a:graphic>
-          <a:graphicData uri="http://schemas.openxmlformats.org/presentationml/2006/ole">
-            <mc:AlternateContent xmlns:mc="http://schemas.openxmlformats.org/markup-compatibility/2006">
-              <mc:Choice xmlns:v="urn:schemas-microsoft-com:vml" Requires="v">
-                <p:oleObj spid="_x0000_s1032" name="Объект упаковщика для оболочки" showAsIcon="1" r:id="rId5" imgW="707040" imgH="491040" progId="Package">
-                  <p:embed/>
-                </p:oleObj>
-              </mc:Choice>
-              <mc:Fallback>
-                <p:oleObj name="Объект упаковщика для оболочки" showAsIcon="1" r:id="rId5" imgW="707040" imgH="491040" progId="Package">
-                  <p:embed/>
-                  <p:pic>
-                    <p:nvPicPr>
-                      <p:cNvPr id="16" name="Объект 15">
-                        <a:extLst>
-                          <a:ext uri="{FF2B5EF4-FFF2-40B4-BE49-F238E27FC236}">
-                            <a16:creationId xmlns:a16="http://schemas.microsoft.com/office/drawing/2014/main" id="{9F7724D8-8CF5-48D2-B5DB-77B2D96098B5}"/>
-                          </a:ext>
-                        </a:extLst>
-                      </p:cNvPr>
-                      <p:cNvPicPr/>
-                      <p:nvPr/>
-                    </p:nvPicPr>
-                    <p:blipFill>
-                      <a:blip r:embed="rId6"/>
-                      <a:stretch>
-                        <a:fillRect/>
-                      </a:stretch>
-                    </p:blipFill>
-                    <p:spPr>
-                      <a:xfrm>
-                        <a:off x="9882519" y="5015345"/>
-                        <a:ext cx="1838427" cy="1276570"/>
-                      </a:xfrm>
-                      <a:prstGeom prst="rect">
-                        <a:avLst/>
-                      </a:prstGeom>
-                    </p:spPr>
-                  </p:pic>
-                </p:oleObj>
-              </mc:Fallback>
-            </mc:AlternateContent>
-          </a:graphicData>
-        </a:graphic>
-      </p:graphicFrame>
+        <p:txBody>
+          <a:bodyPr wrap="square">
+            <a:spAutoFit/>
+          </a:bodyPr>
+          <a:lstStyle/>
+          <a:p>
+            <a:r>
+              <a:rPr lang="en-US" sz="2400" b="0" dirty="0">
+                <a:solidFill>
+                  <a:srgbClr val="569CD6"/>
+                </a:solidFill>
+                <a:effectLst/>
+                <a:latin typeface="Consolas" panose="020B0609020204030204" pitchFamily="49" charset="0"/>
+              </a:rPr>
+              <a:t>class</a:t>
+            </a:r>
+            <a:r>
+              <a:rPr lang="en-US" sz="2400" b="0" dirty="0">
+                <a:solidFill>
+                  <a:srgbClr val="D4D4D4"/>
+                </a:solidFill>
+                <a:effectLst/>
+                <a:latin typeface="Consolas" panose="020B0609020204030204" pitchFamily="49" charset="0"/>
+              </a:rPr>
+              <a:t> </a:t>
+            </a:r>
+            <a:r>
+              <a:rPr lang="en-US" sz="2400" b="0" dirty="0">
+                <a:solidFill>
+                  <a:srgbClr val="4EC9B0"/>
+                </a:solidFill>
+                <a:effectLst/>
+                <a:latin typeface="Consolas" panose="020B0609020204030204" pitchFamily="49" charset="0"/>
+              </a:rPr>
+              <a:t>K</a:t>
+            </a:r>
+            <a:r>
+              <a:rPr lang="en-US" sz="2400" b="0" dirty="0">
+                <a:solidFill>
+                  <a:srgbClr val="D4D4D4"/>
+                </a:solidFill>
+                <a:effectLst/>
+                <a:latin typeface="Consolas" panose="020B0609020204030204" pitchFamily="49" charset="0"/>
+              </a:rPr>
+              <a:t>:</a:t>
+            </a:r>
+          </a:p>
+          <a:p>
+            <a:r>
+              <a:rPr lang="en-US" sz="2400" b="0" dirty="0">
+                <a:solidFill>
+                  <a:srgbClr val="D4D4D4"/>
+                </a:solidFill>
+                <a:effectLst/>
+                <a:latin typeface="Consolas" panose="020B0609020204030204" pitchFamily="49" charset="0"/>
+              </a:rPr>
+              <a:t>    </a:t>
+            </a:r>
+            <a:r>
+              <a:rPr lang="en-US" sz="2400" b="0" dirty="0">
+                <a:solidFill>
+                  <a:srgbClr val="569CD6"/>
+                </a:solidFill>
+                <a:effectLst/>
+                <a:latin typeface="Consolas" panose="020B0609020204030204" pitchFamily="49" charset="0"/>
+              </a:rPr>
+              <a:t>def</a:t>
+            </a:r>
+            <a:r>
+              <a:rPr lang="en-US" sz="2400" b="0" dirty="0">
+                <a:solidFill>
+                  <a:srgbClr val="D4D4D4"/>
+                </a:solidFill>
+                <a:effectLst/>
+                <a:latin typeface="Consolas" panose="020B0609020204030204" pitchFamily="49" charset="0"/>
+              </a:rPr>
+              <a:t> </a:t>
+            </a:r>
+            <a:r>
+              <a:rPr lang="en-US" sz="2400" b="0" dirty="0">
+                <a:solidFill>
+                  <a:srgbClr val="DCDCAA"/>
+                </a:solidFill>
+                <a:effectLst/>
+                <a:latin typeface="Consolas" panose="020B0609020204030204" pitchFamily="49" charset="0"/>
+              </a:rPr>
+              <a:t>__</a:t>
+            </a:r>
+            <a:r>
+              <a:rPr lang="en-US" sz="2400" b="0" dirty="0" err="1">
+                <a:solidFill>
+                  <a:srgbClr val="DCDCAA"/>
+                </a:solidFill>
+                <a:effectLst/>
+                <a:latin typeface="Consolas" panose="020B0609020204030204" pitchFamily="49" charset="0"/>
+              </a:rPr>
+              <a:t>init</a:t>
+            </a:r>
+            <a:r>
+              <a:rPr lang="en-US" sz="2400" b="0" dirty="0">
+                <a:solidFill>
+                  <a:srgbClr val="DCDCAA"/>
+                </a:solidFill>
+                <a:effectLst/>
+                <a:latin typeface="Consolas" panose="020B0609020204030204" pitchFamily="49" charset="0"/>
+              </a:rPr>
+              <a:t>__</a:t>
+            </a:r>
+            <a:r>
+              <a:rPr lang="en-US" sz="2400" b="0" dirty="0">
+                <a:solidFill>
+                  <a:srgbClr val="D4D4D4"/>
+                </a:solidFill>
+                <a:effectLst/>
+                <a:latin typeface="Consolas" panose="020B0609020204030204" pitchFamily="49" charset="0"/>
+              </a:rPr>
+              <a:t> (</a:t>
+            </a:r>
+            <a:r>
+              <a:rPr lang="en-US" sz="2400" b="0" dirty="0">
+                <a:solidFill>
+                  <a:srgbClr val="9CDCFE"/>
+                </a:solidFill>
+                <a:effectLst/>
+                <a:latin typeface="Consolas" panose="020B0609020204030204" pitchFamily="49" charset="0"/>
+              </a:rPr>
+              <a:t>self</a:t>
+            </a:r>
+            <a:r>
+              <a:rPr lang="en-US" sz="2400" b="0" dirty="0">
+                <a:solidFill>
+                  <a:srgbClr val="D4D4D4"/>
+                </a:solidFill>
+                <a:effectLst/>
+                <a:latin typeface="Consolas" panose="020B0609020204030204" pitchFamily="49" charset="0"/>
+              </a:rPr>
+              <a:t>, </a:t>
+            </a:r>
+            <a:r>
+              <a:rPr lang="en-US" sz="2400" b="0" dirty="0">
+                <a:solidFill>
+                  <a:srgbClr val="9CDCFE"/>
+                </a:solidFill>
+                <a:effectLst/>
+                <a:latin typeface="Consolas" panose="020B0609020204030204" pitchFamily="49" charset="0"/>
+              </a:rPr>
+              <a:t>a</a:t>
+            </a:r>
+            <a:r>
+              <a:rPr lang="en-US" sz="2400" b="0" dirty="0">
+                <a:solidFill>
+                  <a:srgbClr val="D4D4D4"/>
+                </a:solidFill>
+                <a:effectLst/>
+                <a:latin typeface="Consolas" panose="020B0609020204030204" pitchFamily="49" charset="0"/>
+              </a:rPr>
+              <a:t>, </a:t>
+            </a:r>
+            <a:r>
+              <a:rPr lang="en-US" sz="2400" b="0" dirty="0">
+                <a:solidFill>
+                  <a:srgbClr val="9CDCFE"/>
+                </a:solidFill>
+                <a:effectLst/>
+                <a:latin typeface="Consolas" panose="020B0609020204030204" pitchFamily="49" charset="0"/>
+              </a:rPr>
+              <a:t>b</a:t>
+            </a:r>
+            <a:r>
+              <a:rPr lang="en-US" sz="2400" b="0" dirty="0">
+                <a:solidFill>
+                  <a:srgbClr val="D4D4D4"/>
+                </a:solidFill>
+                <a:effectLst/>
+                <a:latin typeface="Consolas" panose="020B0609020204030204" pitchFamily="49" charset="0"/>
+              </a:rPr>
+              <a:t>):</a:t>
+            </a:r>
+          </a:p>
+          <a:p>
+            <a:r>
+              <a:rPr lang="en-US" sz="2400" b="0" dirty="0">
+                <a:solidFill>
+                  <a:srgbClr val="D4D4D4"/>
+                </a:solidFill>
+                <a:effectLst/>
+                <a:latin typeface="Consolas" panose="020B0609020204030204" pitchFamily="49" charset="0"/>
+              </a:rPr>
+              <a:t>        </a:t>
+            </a:r>
+            <a:r>
+              <a:rPr lang="en-US" sz="2400" b="0" dirty="0">
+                <a:solidFill>
+                  <a:srgbClr val="C586C0"/>
+                </a:solidFill>
+                <a:effectLst/>
+                <a:latin typeface="Consolas" panose="020B0609020204030204" pitchFamily="49" charset="0"/>
+              </a:rPr>
+              <a:t>try</a:t>
+            </a:r>
+            <a:r>
+              <a:rPr lang="en-US" sz="2400" b="0" dirty="0">
+                <a:solidFill>
+                  <a:srgbClr val="D4D4D4"/>
+                </a:solidFill>
+                <a:effectLst/>
+                <a:latin typeface="Consolas" panose="020B0609020204030204" pitchFamily="49" charset="0"/>
+              </a:rPr>
+              <a:t>:</a:t>
+            </a:r>
+          </a:p>
+          <a:p>
+            <a:r>
+              <a:rPr lang="en-US" sz="2400" b="0" dirty="0">
+                <a:solidFill>
+                  <a:srgbClr val="D4D4D4"/>
+                </a:solidFill>
+                <a:effectLst/>
+                <a:latin typeface="Consolas" panose="020B0609020204030204" pitchFamily="49" charset="0"/>
+              </a:rPr>
+              <a:t>            </a:t>
+            </a:r>
+            <a:r>
+              <a:rPr lang="en-US" sz="2400" b="0" dirty="0" err="1">
+                <a:solidFill>
+                  <a:srgbClr val="569CD6"/>
+                </a:solidFill>
+                <a:effectLst/>
+                <a:latin typeface="Consolas" panose="020B0609020204030204" pitchFamily="49" charset="0"/>
+              </a:rPr>
+              <a:t>self</a:t>
+            </a:r>
+            <a:r>
+              <a:rPr lang="en-US" sz="2400" b="0" dirty="0" err="1">
+                <a:solidFill>
+                  <a:srgbClr val="D4D4D4"/>
+                </a:solidFill>
+                <a:effectLst/>
+                <a:latin typeface="Consolas" panose="020B0609020204030204" pitchFamily="49" charset="0"/>
+              </a:rPr>
+              <a:t>.c</a:t>
+            </a:r>
+            <a:r>
+              <a:rPr lang="en-US" sz="2400" b="0" dirty="0">
+                <a:solidFill>
+                  <a:srgbClr val="D4D4D4"/>
+                </a:solidFill>
+                <a:effectLst/>
+                <a:latin typeface="Consolas" panose="020B0609020204030204" pitchFamily="49" charset="0"/>
+              </a:rPr>
+              <a:t> = a / b</a:t>
+            </a:r>
+          </a:p>
+          <a:p>
+            <a:r>
+              <a:rPr lang="en-US" sz="2400" b="0" dirty="0">
+                <a:solidFill>
+                  <a:srgbClr val="D4D4D4"/>
+                </a:solidFill>
+                <a:effectLst/>
+                <a:latin typeface="Consolas" panose="020B0609020204030204" pitchFamily="49" charset="0"/>
+              </a:rPr>
+              <a:t>        </a:t>
+            </a:r>
+            <a:r>
+              <a:rPr lang="en-US" sz="2400" b="0" dirty="0">
+                <a:solidFill>
+                  <a:srgbClr val="C586C0"/>
+                </a:solidFill>
+                <a:effectLst/>
+                <a:latin typeface="Consolas" panose="020B0609020204030204" pitchFamily="49" charset="0"/>
+              </a:rPr>
+              <a:t>except</a:t>
+            </a:r>
+            <a:r>
+              <a:rPr lang="en-US" sz="2400" b="0" dirty="0">
+                <a:solidFill>
+                  <a:srgbClr val="D4D4D4"/>
+                </a:solidFill>
+                <a:effectLst/>
+                <a:latin typeface="Consolas" panose="020B0609020204030204" pitchFamily="49" charset="0"/>
+              </a:rPr>
+              <a:t> </a:t>
+            </a:r>
+            <a:r>
+              <a:rPr lang="en-US" sz="2400" b="0" dirty="0" err="1">
+                <a:solidFill>
+                  <a:srgbClr val="4EC9B0"/>
+                </a:solidFill>
+                <a:effectLst/>
+                <a:latin typeface="Consolas" panose="020B0609020204030204" pitchFamily="49" charset="0"/>
+              </a:rPr>
+              <a:t>ZeroDivisionError</a:t>
+            </a:r>
+            <a:r>
+              <a:rPr lang="en-US" sz="2400" b="0" dirty="0">
+                <a:solidFill>
+                  <a:srgbClr val="D4D4D4"/>
+                </a:solidFill>
+                <a:effectLst/>
+                <a:latin typeface="Consolas" panose="020B0609020204030204" pitchFamily="49" charset="0"/>
+              </a:rPr>
+              <a:t>:</a:t>
+            </a:r>
+          </a:p>
+          <a:p>
+            <a:r>
+              <a:rPr lang="en-US" sz="2400" b="0" dirty="0">
+                <a:solidFill>
+                  <a:srgbClr val="D4D4D4"/>
+                </a:solidFill>
+                <a:effectLst/>
+                <a:latin typeface="Consolas" panose="020B0609020204030204" pitchFamily="49" charset="0"/>
+              </a:rPr>
+              <a:t>            </a:t>
+            </a:r>
+            <a:r>
+              <a:rPr lang="en-US" sz="2400" b="0" dirty="0">
+                <a:solidFill>
+                  <a:srgbClr val="DCDCAA"/>
+                </a:solidFill>
+                <a:effectLst/>
+                <a:latin typeface="Consolas" panose="020B0609020204030204" pitchFamily="49" charset="0"/>
+              </a:rPr>
+              <a:t>print</a:t>
+            </a:r>
+            <a:r>
+              <a:rPr lang="en-US" sz="2400" b="0" dirty="0">
+                <a:solidFill>
+                  <a:srgbClr val="D4D4D4"/>
+                </a:solidFill>
+                <a:effectLst/>
+                <a:latin typeface="Consolas" panose="020B0609020204030204" pitchFamily="49" charset="0"/>
+              </a:rPr>
+              <a:t>(</a:t>
+            </a:r>
+            <a:r>
+              <a:rPr lang="en-US" sz="2400" b="0" dirty="0">
+                <a:solidFill>
+                  <a:srgbClr val="CE9178"/>
+                </a:solidFill>
+                <a:effectLst/>
+                <a:latin typeface="Consolas" panose="020B0609020204030204" pitchFamily="49" charset="0"/>
+              </a:rPr>
+              <a:t>"</a:t>
+            </a:r>
+            <a:r>
+              <a:rPr lang="uk-UA" sz="2400" b="0" dirty="0">
+                <a:solidFill>
+                  <a:srgbClr val="CE9178"/>
+                </a:solidFill>
+                <a:effectLst/>
+                <a:latin typeface="Consolas" panose="020B0609020204030204" pitchFamily="49" charset="0"/>
+              </a:rPr>
+              <a:t>Ділення на нуль"</a:t>
+            </a:r>
+            <a:r>
+              <a:rPr lang="uk-UA" sz="2400" b="0" dirty="0">
+                <a:solidFill>
+                  <a:srgbClr val="D4D4D4"/>
+                </a:solidFill>
+                <a:effectLst/>
+                <a:latin typeface="Consolas" panose="020B0609020204030204" pitchFamily="49" charset="0"/>
+              </a:rPr>
+              <a:t>)</a:t>
+            </a:r>
+          </a:p>
+          <a:p>
+            <a:r>
+              <a:rPr lang="uk-UA" sz="2400" b="0" dirty="0">
+                <a:solidFill>
+                  <a:srgbClr val="D4D4D4"/>
+                </a:solidFill>
+                <a:effectLst/>
+                <a:latin typeface="Consolas" panose="020B0609020204030204" pitchFamily="49" charset="0"/>
+              </a:rPr>
+              <a:t>        </a:t>
+            </a:r>
+            <a:r>
+              <a:rPr lang="en-US" sz="2400" b="0" dirty="0">
+                <a:solidFill>
+                  <a:srgbClr val="C586C0"/>
+                </a:solidFill>
+                <a:effectLst/>
+                <a:latin typeface="Consolas" panose="020B0609020204030204" pitchFamily="49" charset="0"/>
+              </a:rPr>
+              <a:t>else</a:t>
+            </a:r>
+            <a:r>
+              <a:rPr lang="en-US" sz="2400" b="0" dirty="0">
+                <a:solidFill>
+                  <a:srgbClr val="D4D4D4"/>
+                </a:solidFill>
+                <a:effectLst/>
+                <a:latin typeface="Consolas" panose="020B0609020204030204" pitchFamily="49" charset="0"/>
+              </a:rPr>
+              <a:t>:</a:t>
+            </a:r>
+          </a:p>
+          <a:p>
+            <a:r>
+              <a:rPr lang="en-US" sz="2400" b="0" dirty="0">
+                <a:solidFill>
+                  <a:srgbClr val="D4D4D4"/>
+                </a:solidFill>
+                <a:effectLst/>
+                <a:latin typeface="Consolas" panose="020B0609020204030204" pitchFamily="49" charset="0"/>
+              </a:rPr>
+              <a:t>            </a:t>
+            </a:r>
+            <a:r>
+              <a:rPr lang="en-US" sz="2400" b="0" dirty="0">
+                <a:solidFill>
+                  <a:srgbClr val="DCDCAA"/>
+                </a:solidFill>
+                <a:effectLst/>
+                <a:latin typeface="Consolas" panose="020B0609020204030204" pitchFamily="49" charset="0"/>
+              </a:rPr>
+              <a:t>print</a:t>
+            </a:r>
+            <a:r>
+              <a:rPr lang="en-US" sz="2400" b="0" dirty="0">
+                <a:solidFill>
+                  <a:srgbClr val="D4D4D4"/>
+                </a:solidFill>
+                <a:effectLst/>
+                <a:latin typeface="Consolas" panose="020B0609020204030204" pitchFamily="49" charset="0"/>
+              </a:rPr>
+              <a:t>(</a:t>
+            </a:r>
+            <a:r>
+              <a:rPr lang="en-US" sz="2400" b="0" dirty="0">
+                <a:solidFill>
+                  <a:srgbClr val="CE9178"/>
+                </a:solidFill>
+                <a:effectLst/>
+                <a:latin typeface="Consolas" panose="020B0609020204030204" pitchFamily="49" charset="0"/>
+              </a:rPr>
+              <a:t>"</a:t>
+            </a:r>
+            <a:r>
+              <a:rPr lang="uk-UA" sz="2400" b="0" dirty="0">
+                <a:solidFill>
+                  <a:srgbClr val="CE9178"/>
+                </a:solidFill>
+                <a:effectLst/>
+                <a:latin typeface="Consolas" panose="020B0609020204030204" pitchFamily="49" charset="0"/>
+              </a:rPr>
+              <a:t>Результат:"</a:t>
+            </a:r>
+            <a:r>
+              <a:rPr lang="uk-UA" sz="2400" b="0" dirty="0">
+                <a:solidFill>
+                  <a:srgbClr val="D4D4D4"/>
+                </a:solidFill>
+                <a:effectLst/>
+                <a:latin typeface="Consolas" panose="020B0609020204030204" pitchFamily="49" charset="0"/>
+              </a:rPr>
+              <a:t>, </a:t>
+            </a:r>
+            <a:r>
+              <a:rPr lang="en-US" sz="2400" b="0" dirty="0" err="1">
+                <a:solidFill>
+                  <a:srgbClr val="569CD6"/>
+                </a:solidFill>
+                <a:effectLst/>
+                <a:latin typeface="Consolas" panose="020B0609020204030204" pitchFamily="49" charset="0"/>
+              </a:rPr>
+              <a:t>self</a:t>
+            </a:r>
+            <a:r>
+              <a:rPr lang="en-US" sz="2400" b="0" dirty="0" err="1">
+                <a:solidFill>
+                  <a:srgbClr val="D4D4D4"/>
+                </a:solidFill>
+                <a:effectLst/>
+                <a:latin typeface="Consolas" panose="020B0609020204030204" pitchFamily="49" charset="0"/>
+              </a:rPr>
+              <a:t>.c</a:t>
+            </a:r>
+            <a:r>
+              <a:rPr lang="en-US" sz="2400" b="0" dirty="0">
+                <a:solidFill>
+                  <a:srgbClr val="D4D4D4"/>
+                </a:solidFill>
+                <a:effectLst/>
+                <a:latin typeface="Consolas" panose="020B0609020204030204" pitchFamily="49" charset="0"/>
+              </a:rPr>
+              <a:t>)</a:t>
+            </a:r>
+          </a:p>
+          <a:p>
+            <a:r>
+              <a:rPr lang="en-US" sz="2400" b="0" dirty="0">
+                <a:solidFill>
+                  <a:srgbClr val="D4D4D4"/>
+                </a:solidFill>
+                <a:effectLst/>
+                <a:latin typeface="Consolas" panose="020B0609020204030204" pitchFamily="49" charset="0"/>
+              </a:rPr>
+              <a:t>        </a:t>
+            </a:r>
+            <a:r>
+              <a:rPr lang="en-US" sz="2400" b="0" dirty="0">
+                <a:solidFill>
+                  <a:srgbClr val="C586C0"/>
+                </a:solidFill>
+                <a:effectLst/>
+                <a:latin typeface="Consolas" panose="020B0609020204030204" pitchFamily="49" charset="0"/>
+              </a:rPr>
+              <a:t>finally</a:t>
+            </a:r>
+            <a:r>
+              <a:rPr lang="en-US" sz="2400" b="0" dirty="0">
+                <a:solidFill>
+                  <a:srgbClr val="D4D4D4"/>
+                </a:solidFill>
+                <a:effectLst/>
+                <a:latin typeface="Consolas" panose="020B0609020204030204" pitchFamily="49" charset="0"/>
+              </a:rPr>
+              <a:t>:</a:t>
+            </a:r>
+          </a:p>
+          <a:p>
+            <a:r>
+              <a:rPr lang="en-US" sz="2400" b="0" dirty="0">
+                <a:solidFill>
+                  <a:srgbClr val="D4D4D4"/>
+                </a:solidFill>
+                <a:effectLst/>
+                <a:latin typeface="Consolas" panose="020B0609020204030204" pitchFamily="49" charset="0"/>
+              </a:rPr>
+              <a:t>            </a:t>
+            </a:r>
+            <a:r>
+              <a:rPr lang="en-US" sz="2400" b="0" dirty="0">
+                <a:solidFill>
+                  <a:srgbClr val="DCDCAA"/>
+                </a:solidFill>
+                <a:effectLst/>
+                <a:latin typeface="Consolas" panose="020B0609020204030204" pitchFamily="49" charset="0"/>
+              </a:rPr>
+              <a:t>print</a:t>
+            </a:r>
+            <a:r>
+              <a:rPr lang="en-US" sz="2400" b="0" dirty="0">
+                <a:solidFill>
+                  <a:srgbClr val="D4D4D4"/>
+                </a:solidFill>
+                <a:effectLst/>
+                <a:latin typeface="Consolas" panose="020B0609020204030204" pitchFamily="49" charset="0"/>
+              </a:rPr>
+              <a:t>(</a:t>
+            </a:r>
+            <a:r>
+              <a:rPr lang="en-US" sz="2400" b="0" dirty="0">
+                <a:solidFill>
+                  <a:srgbClr val="CE9178"/>
+                </a:solidFill>
+                <a:effectLst/>
+                <a:latin typeface="Consolas" panose="020B0609020204030204" pitchFamily="49" charset="0"/>
+              </a:rPr>
+              <a:t>"</a:t>
+            </a:r>
+            <a:r>
+              <a:rPr lang="uk-UA" sz="2400" b="0" dirty="0">
+                <a:solidFill>
+                  <a:srgbClr val="CE9178"/>
+                </a:solidFill>
+                <a:effectLst/>
+                <a:latin typeface="Consolas" panose="020B0609020204030204" pitchFamily="49" charset="0"/>
+              </a:rPr>
+              <a:t>Програма завершена"</a:t>
+            </a:r>
+            <a:r>
+              <a:rPr lang="uk-UA" sz="2400" b="0" dirty="0">
+                <a:solidFill>
+                  <a:srgbClr val="D4D4D4"/>
+                </a:solidFill>
+                <a:effectLst/>
+                <a:latin typeface="Consolas" panose="020B0609020204030204" pitchFamily="49" charset="0"/>
+              </a:rPr>
+              <a:t>)</a:t>
+            </a:r>
+          </a:p>
+          <a:p>
+            <a:br>
+              <a:rPr lang="uk-UA" sz="2400" b="0" dirty="0">
+                <a:solidFill>
+                  <a:srgbClr val="D4D4D4"/>
+                </a:solidFill>
+                <a:effectLst/>
+                <a:latin typeface="Consolas" panose="020B0609020204030204" pitchFamily="49" charset="0"/>
+              </a:rPr>
+            </a:br>
+            <a:r>
+              <a:rPr lang="en-US" sz="2400" b="0" dirty="0">
+                <a:solidFill>
+                  <a:srgbClr val="D4D4D4"/>
+                </a:solidFill>
+                <a:effectLst/>
+                <a:latin typeface="Consolas" panose="020B0609020204030204" pitchFamily="49" charset="0"/>
+              </a:rPr>
+              <a:t>k = K(</a:t>
+            </a:r>
+            <a:r>
+              <a:rPr lang="en-US" sz="2400" b="0" dirty="0">
+                <a:solidFill>
+                  <a:srgbClr val="B5CEA8"/>
+                </a:solidFill>
+                <a:effectLst/>
+                <a:latin typeface="Consolas" panose="020B0609020204030204" pitchFamily="49" charset="0"/>
+              </a:rPr>
+              <a:t>3</a:t>
+            </a:r>
+            <a:r>
+              <a:rPr lang="en-US" sz="2400" b="0" dirty="0">
+                <a:solidFill>
+                  <a:srgbClr val="D4D4D4"/>
+                </a:solidFill>
+                <a:effectLst/>
+                <a:latin typeface="Consolas" panose="020B0609020204030204" pitchFamily="49" charset="0"/>
+              </a:rPr>
+              <a:t>, </a:t>
+            </a:r>
+            <a:r>
+              <a:rPr lang="en-US" sz="2400" b="0" dirty="0">
+                <a:solidFill>
+                  <a:srgbClr val="B5CEA8"/>
+                </a:solidFill>
+                <a:effectLst/>
+                <a:latin typeface="Consolas" panose="020B0609020204030204" pitchFamily="49" charset="0"/>
+              </a:rPr>
+              <a:t>0</a:t>
+            </a:r>
+            <a:r>
+              <a:rPr lang="en-US" sz="2400" b="0" dirty="0">
+                <a:solidFill>
+                  <a:srgbClr val="D4D4D4"/>
+                </a:solidFill>
+                <a:effectLst/>
+                <a:latin typeface="Consolas" panose="020B0609020204030204" pitchFamily="49" charset="0"/>
+              </a:rPr>
+              <a:t>)</a:t>
+            </a:r>
+          </a:p>
+        </p:txBody>
+      </p:sp>
     </p:spTree>
     <p:extLst>
       <p:ext uri="{BB962C8B-B14F-4D97-AF65-F5344CB8AC3E}">
-        <p14:creationId xmlns:p14="http://schemas.microsoft.com/office/powerpoint/2010/main" val="3701497741"/>
+        <p14:creationId xmlns:p14="http://schemas.microsoft.com/office/powerpoint/2010/main" val="526746473"/>
       </p:ext>
     </p:extLst>
   </p:cSld>
@@ -22737,7 +22934,7 @@
         <p:spPr>
           <a:xfrm>
             <a:off x="1024128" y="2286000"/>
-            <a:ext cx="9720073" cy="1288473"/>
+            <a:ext cx="9720073" cy="2286000"/>
           </a:xfrm>
         </p:spPr>
         <p:txBody>
@@ -22748,13 +22945,32 @@
           <a:p>
             <a:r>
               <a:rPr lang="uk-UA" sz="3600" dirty="0"/>
-              <a:t>Опрацювати §7.3</a:t>
+              <a:t>Опрацювати §7.</a:t>
+            </a:r>
+            <a:r>
+              <a:rPr lang="en-US" sz="3600" dirty="0"/>
+              <a:t>4, 7.5</a:t>
+            </a:r>
+          </a:p>
+          <a:p>
+            <a:r>
+              <a:rPr lang="uk-UA" sz="3600" dirty="0"/>
+              <a:t>Готуватися до тесту </a:t>
+            </a:r>
+          </a:p>
+          <a:p>
+            <a:r>
+              <a:rPr lang="uk-UA" sz="3600" dirty="0"/>
+              <a:t>по підрозділах 6 та 7</a:t>
             </a:r>
             <a:r>
               <a:rPr lang="en-US" sz="3600" dirty="0"/>
               <a:t> </a:t>
             </a:r>
-            <a:endParaRPr lang="uk-UA" sz="3600" dirty="0"/>
+            <a:r>
+              <a:rPr lang="uk-UA" sz="3600" dirty="0"/>
+              <a:t>(ст. 77 – 109)</a:t>
+            </a:r>
           </a:p>
           <a:p>
             <a:endParaRPr lang="uk-UA" sz="3600" dirty="0"/>

</xml_diff>